<commit_message>
Updated reproducibility for ISC
</commit_message>
<xml_diff>
--- a/reproducibility.pptx
+++ b/reproducibility.pptx
@@ -285,7 +285,7 @@
           <a:p>
             <a:fld id="{0B842F42-2CE9-4E35-95C1-410DC08A50B1}" type="datetimeFigureOut">
               <a:rPr lang="en-US" smtClean="0"/>
-              <a:t>5/21/2021</a:t>
+              <a:t>6/15/2021</a:t>
             </a:fld>
             <a:endParaRPr lang="en-US"/>
           </a:p>
@@ -450,7 +450,7 @@
           <a:p>
             <a:fld id="{6F282904-F315-4730-8D91-37D99E141A6F}" type="datetimeFigureOut">
               <a:rPr lang="en-US" smtClean="0"/>
-              <a:t>5/21/2021</a:t>
+              <a:t>6/15/2021</a:t>
             </a:fld>
             <a:endParaRPr lang="en-US"/>
           </a:p>
@@ -5947,7 +5947,23 @@
           <a:p>
             <a:r>
               <a:rPr lang="en-US" dirty="0"/>
-              <a:t>Fair data principles for maximum use of research data</a:t>
+              <a:t>FAIR data principles for maximum use of research data</a:t>
+            </a:r>
+          </a:p>
+          <a:p>
+            <a:r>
+              <a:rPr lang="en-US" dirty="0"/>
+              <a:t>Emerging FAIR for Research Software (</a:t>
+            </a:r>
+            <a:r>
+              <a:rPr lang="en-US" dirty="0">
+                <a:hlinkClick r:id="rId2"/>
+              </a:rPr>
+              <a:t>FAIR4RS</a:t>
+            </a:r>
+            <a:r>
+              <a:rPr lang="en-US" dirty="0"/>
+              <a:t>) initiative</a:t>
             </a:r>
           </a:p>
           <a:p>
@@ -6120,6 +6136,11 @@
             </a:r>
           </a:p>
           <a:p>
+            <a:pPr>
+              <a:spcBef>
+                <a:spcPts val="800"/>
+              </a:spcBef>
+            </a:pPr>
             <a:r>
               <a:rPr lang="en-US" dirty="0"/>
               <a:t>Example: NSF policy on </a:t>
@@ -6287,6 +6308,11 @@
             </a:r>
           </a:p>
           <a:p>
+            <a:pPr>
+              <a:spcBef>
+                <a:spcPts val="800"/>
+              </a:spcBef>
+            </a:pPr>
             <a:r>
               <a:rPr lang="en-US" dirty="0"/>
               <a:t>Findability</a:t>
@@ -6698,7 +6724,7 @@
           <a:p>
             <a:r>
               <a:rPr lang="en-US" dirty="0"/>
-              <a:t>SC20 Transparency and  Reproducibility Initiative</a:t>
+              <a:t>Supercomputing Reproducibility Initiative</a:t>
             </a:r>
           </a:p>
         </p:txBody>
@@ -6732,21 +6758,21 @@
             <a:pPr lvl="1"/>
             <a:r>
               <a:rPr lang="en-US" sz="2400" dirty="0"/>
-              <a:t>Artifact description (AD).</a:t>
+              <a:t>Artifact description (AD)</a:t>
             </a:r>
           </a:p>
           <a:p>
             <a:pPr lvl="2"/>
             <a:r>
               <a:rPr lang="en-US" sz="2000" dirty="0"/>
-              <a:t>Blue print for setting up your computational experiment.</a:t>
+              <a:t>Blue print for setting up your computational experiment</a:t>
             </a:r>
           </a:p>
           <a:p>
             <a:pPr lvl="2"/>
             <a:r>
               <a:rPr lang="en-US" sz="2000" dirty="0"/>
-              <a:t>Makes it easier to rerun computations in future.</a:t>
+              <a:t>Makes it easier to rerun computations in future</a:t>
             </a:r>
           </a:p>
           <a:p>
@@ -6761,35 +6787,42 @@
             </a:r>
             <a:r>
               <a:rPr lang="en-US" sz="2000" dirty="0"/>
-              <a:t> for paper submissions (since SC19).</a:t>
+              <a:t> for paper submissions (since SC19)</a:t>
             </a:r>
           </a:p>
           <a:p>
             <a:pPr lvl="2"/>
             <a:r>
               <a:rPr lang="en-US" sz="2000" dirty="0"/>
-              <a:t>Largely auto-generated from submission information.</a:t>
+              <a:t>Largely auto-generated from submission information</a:t>
+            </a:r>
+          </a:p>
+          <a:p>
+            <a:pPr lvl="2"/>
+            <a:r>
+              <a:rPr lang="en-US" sz="2000" dirty="0"/>
+              <a:t>For accepted papers, will be evaluated by reviewers</a:t>
             </a:r>
           </a:p>
           <a:p>
             <a:pPr lvl="1"/>
             <a:r>
               <a:rPr lang="en-US" sz="2400" dirty="0"/>
-              <a:t>Artifact Evaluation (AE).</a:t>
+              <a:t>Artifact Evaluation (AE)</a:t>
             </a:r>
           </a:p>
           <a:p>
             <a:pPr lvl="2"/>
             <a:r>
               <a:rPr lang="en-US" sz="2000" dirty="0"/>
-              <a:t>Targets “boutique” environments.</a:t>
+              <a:t>Targets “boutique” environments</a:t>
             </a:r>
           </a:p>
           <a:p>
             <a:pPr lvl="2"/>
             <a:r>
               <a:rPr lang="en-US" sz="2000" dirty="0"/>
-              <a:t>Improves trustworthiness when re-running hard, impossible.</a:t>
+              <a:t>Improves trustworthiness when re-running hard, impossible</a:t>
             </a:r>
           </a:p>
           <a:p>
@@ -6802,20 +6835,15 @@
           <a:p>
             <a:r>
               <a:rPr lang="en-US" sz="2800" dirty="0"/>
-              <a:t>Details:</a:t>
-            </a:r>
-          </a:p>
-          <a:p>
-            <a:pPr lvl="1"/>
+              <a:t>Details: </a:t>
+            </a:r>
             <a:r>
               <a:rPr lang="en-US" sz="2400" dirty="0">
                 <a:hlinkClick r:id="rId2"/>
               </a:rPr>
-              <a:t>https://sc20.supercomputing.org/submit/transparency-reproducibility-initiative/</a:t>
-            </a:r>
-            <a:endParaRPr lang="en-US" sz="2400" dirty="0">
-              <a:hlinkClick r:id="rId3"/>
-            </a:endParaRPr>
+              <a:t>https://sc21.supercomputing.org/submit/reproducibility-initiative/</a:t>
+            </a:r>
+            <a:endParaRPr lang="en-US" sz="2400" dirty="0"/>
           </a:p>
         </p:txBody>
       </p:sp>
@@ -10561,7 +10589,7 @@
         <p:spPr/>
         <p:txBody>
           <a:bodyPr>
-            <a:normAutofit/>
+            <a:normAutofit fontScale="92500" lnSpcReduction="10000"/>
           </a:bodyPr>
           <a:lstStyle/>
           <a:p>
@@ -10590,28 +10618,46 @@
             </a:pPr>
             <a:r>
               <a:rPr lang="en-US" dirty="0"/>
-              <a:t>Editorial: ACM TOMS Replicated Computational Results Initiative. Michael A. Heroux. 2015.  </a:t>
-            </a:r>
-            <a:r>
-              <a:rPr lang="en-US" i="1" dirty="0"/>
-              <a:t>ACM Trans. Math. </a:t>
-            </a:r>
-            <a:r>
-              <a:rPr lang="en-US" i="1" dirty="0" err="1"/>
-              <a:t>Softw</a:t>
-            </a:r>
-            <a:r>
-              <a:rPr lang="en-US" i="1" dirty="0"/>
-              <a:t>.</a:t>
-            </a:r>
-            <a:r>
-              <a:rPr lang="en-US" dirty="0"/>
-              <a:t> 41, 3, Article 13 (June 2015), 5 pages. DOI: </a:t>
+              <a:t>FAIR for Research Software (FAIR4RS) Working Group: </a:t>
             </a:r>
             <a:r>
               <a:rPr lang="en-US" dirty="0">
                 <a:hlinkClick r:id="rId3"/>
               </a:rPr>
+              <a:t>https://www.rd-alliance.org/groups/fair-research-software-fair4rs-wg</a:t>
+            </a:r>
+            <a:endParaRPr lang="en-US" dirty="0"/>
+          </a:p>
+          <a:p>
+            <a:pPr>
+              <a:spcBef>
+                <a:spcPts val="800"/>
+              </a:spcBef>
+            </a:pPr>
+            <a:r>
+              <a:rPr lang="en-US" dirty="0"/>
+              <a:t>Editorial: ACM TOMS Replicated Computational Results Initiative. Michael A. Heroux. 2015.  </a:t>
+            </a:r>
+            <a:r>
+              <a:rPr lang="en-US" i="1" dirty="0"/>
+              <a:t>ACM Trans. Math. </a:t>
+            </a:r>
+            <a:r>
+              <a:rPr lang="en-US" i="1" dirty="0" err="1"/>
+              <a:t>Softw</a:t>
+            </a:r>
+            <a:r>
+              <a:rPr lang="en-US" i="1" dirty="0"/>
+              <a:t>.</a:t>
+            </a:r>
+            <a:r>
+              <a:rPr lang="en-US" dirty="0"/>
+              <a:t> 41, 3, Article 13 (June 2015), 5 pages. DOI: </a:t>
+            </a:r>
+            <a:r>
+              <a:rPr lang="en-US" dirty="0">
+                <a:hlinkClick r:id="rId4"/>
+              </a:rPr>
               <a:t>http://dx.doi.org/10.1145/2743015</a:t>
             </a:r>
             <a:endParaRPr lang="en-US" dirty="0"/>
@@ -10667,29 +10713,17 @@
             </a:pPr>
             <a:r>
               <a:rPr lang="en-US" dirty="0"/>
-              <a:t>Simple experiments in reproducibility and technical trust by Mike </a:t>
-            </a:r>
-            <a:r>
-              <a:rPr lang="en-US" dirty="0" err="1"/>
-              <a:t>Heroux</a:t>
-            </a:r>
-            <a:r>
-              <a:rPr lang="en-US" dirty="0"/>
-              <a:t> and students (work </a:t>
-            </a:r>
-            <a:r>
-              <a:rPr lang="en-US"/>
-              <a:t>in progress),</a:t>
-            </a:r>
-            <a:r>
-              <a:rPr lang="en-US">
-                <a:hlinkClick r:id="rId4"/>
+              <a:t>Simple experiments in reproducibility and technical trust by Mike Heroux and students (work in progress),</a:t>
+            </a:r>
+            <a:r>
+              <a:rPr lang="en-US" dirty="0">
+                <a:hlinkClick r:id="rId5"/>
               </a:rPr>
               <a:t> </a:t>
             </a:r>
             <a:r>
               <a:rPr lang="en-US" u="sng" dirty="0">
-                <a:hlinkClick r:id="rId4"/>
+                <a:hlinkClick r:id="rId5"/>
               </a:rPr>
               <a:t>https://betterscientificsoftware.github.io/Trust-Tools/</a:t>
             </a:r>
@@ -13161,9 +13195,12 @@
 </file>
 
 <file path=customXml/item1.xml><?xml version="1.0" encoding="utf-8"?>
-<p:properties xmlns:p="http://schemas.microsoft.com/office/2006/metadata/properties" xmlns:xsi="http://www.w3.org/2001/XMLSchema-instance" xmlns:pc="http://schemas.microsoft.com/office/infopath/2007/PartnerControls">
-  <documentManagement/>
-</p:properties>
+<?mso-contentType ?>
+<FormTemplates xmlns="http://schemas.microsoft.com/sharepoint/v3/contenttype/forms">
+  <Display>DocumentLibraryForm</Display>
+  <Edit>DocumentLibraryForm</Edit>
+  <New>DocumentLibraryForm</New>
+</FormTemplates>
 </file>
 
 <file path=customXml/item2.xml><?xml version="1.0" encoding="utf-8"?>
@@ -13216,25 +13253,15 @@
 </file>
 
 <file path=customXml/item3.xml><?xml version="1.0" encoding="utf-8"?>
-<?mso-contentType ?>
-<FormTemplates xmlns="http://schemas.microsoft.com/sharepoint/v3/contenttype/forms">
-  <Display>DocumentLibraryForm</Display>
-  <Edit>DocumentLibraryForm</Edit>
-  <New>DocumentLibraryForm</New>
-</FormTemplates>
+<p:properties xmlns:p="http://schemas.microsoft.com/office/2006/metadata/properties" xmlns:xsi="http://www.w3.org/2001/XMLSchema-instance" xmlns:pc="http://schemas.microsoft.com/office/infopath/2007/PartnerControls">
+  <documentManagement/>
+</p:properties>
 </file>
 
 <file path=customXml/itemProps1.xml><?xml version="1.0" encoding="utf-8"?>
-<ds:datastoreItem xmlns:ds="http://schemas.openxmlformats.org/officeDocument/2006/customXml" ds:itemID="{A50EC660-24D0-43A0-AE5E-E274115E726B}">
+<ds:datastoreItem xmlns:ds="http://schemas.openxmlformats.org/officeDocument/2006/customXml" ds:itemID="{19E20559-B232-4371-8690-E3D8007EDB82}">
   <ds:schemaRefs>
-    <ds:schemaRef ds:uri="http://purl.org/dc/elements/1.1/"/>
-    <ds:schemaRef ds:uri="http://schemas.microsoft.com/office/2006/metadata/properties"/>
-    <ds:schemaRef ds:uri="http://purl.org/dc/terms/"/>
-    <ds:schemaRef ds:uri="http://schemas.openxmlformats.org/package/2006/metadata/core-properties"/>
-    <ds:schemaRef ds:uri="http://schemas.microsoft.com/office/2006/documentManagement/types"/>
-    <ds:schemaRef ds:uri="http://www.w3.org/XML/1998/namespace"/>
-    <ds:schemaRef ds:uri="http://purl.org/dc/dcmitype/"/>
-    <ds:schemaRef ds:uri="http://schemas.microsoft.com/office/infopath/2007/PartnerControls"/>
+    <ds:schemaRef ds:uri="http://schemas.microsoft.com/sharepoint/v3/contenttype/forms"/>
   </ds:schemaRefs>
 </ds:datastoreItem>
 </file>
@@ -13255,9 +13282,16 @@
 </file>
 
 <file path=customXml/itemProps3.xml><?xml version="1.0" encoding="utf-8"?>
-<ds:datastoreItem xmlns:ds="http://schemas.openxmlformats.org/officeDocument/2006/customXml" ds:itemID="{19E20559-B232-4371-8690-E3D8007EDB82}">
+<ds:datastoreItem xmlns:ds="http://schemas.openxmlformats.org/officeDocument/2006/customXml" ds:itemID="{A50EC660-24D0-43A0-AE5E-E274115E726B}">
   <ds:schemaRefs>
-    <ds:schemaRef ds:uri="http://schemas.microsoft.com/sharepoint/v3/contenttype/forms"/>
+    <ds:schemaRef ds:uri="http://purl.org/dc/elements/1.1/"/>
+    <ds:schemaRef ds:uri="http://schemas.microsoft.com/office/2006/metadata/properties"/>
+    <ds:schemaRef ds:uri="http://purl.org/dc/terms/"/>
+    <ds:schemaRef ds:uri="http://schemas.openxmlformats.org/package/2006/metadata/core-properties"/>
+    <ds:schemaRef ds:uri="http://schemas.microsoft.com/office/2006/documentManagement/types"/>
+    <ds:schemaRef ds:uri="http://www.w3.org/XML/1998/namespace"/>
+    <ds:schemaRef ds:uri="http://purl.org/dc/dcmitype/"/>
+    <ds:schemaRef ds:uri="http://schemas.microsoft.com/office/infopath/2007/PartnerControls"/>
   </ds:schemaRefs>
 </ds:datastoreItem>
 </file>
</xml_diff>

<commit_message>
Update Reproducibility for ATPESC
</commit_message>
<xml_diff>
--- a/reproducibility.pptx
+++ b/reproducibility.pptx
@@ -5,10 +5,10 @@
     <p:sldMasterId id="2147483935" r:id="rId4"/>
   </p:sldMasterIdLst>
   <p:notesMasterIdLst>
-    <p:notesMasterId r:id="rId36"/>
+    <p:notesMasterId r:id="rId37"/>
   </p:notesMasterIdLst>
   <p:handoutMasterIdLst>
-    <p:handoutMasterId r:id="rId37"/>
+    <p:handoutMasterId r:id="rId38"/>
   </p:handoutMasterIdLst>
   <p:sldIdLst>
     <p:sldId id="318" r:id="rId5"/>
@@ -32,16 +32,17 @@
     <p:sldId id="1826" r:id="rId23"/>
     <p:sldId id="1821" r:id="rId24"/>
     <p:sldId id="1834" r:id="rId25"/>
-    <p:sldId id="1828" r:id="rId26"/>
-    <p:sldId id="1836" r:id="rId27"/>
-    <p:sldId id="1837" r:id="rId28"/>
-    <p:sldId id="1832" r:id="rId29"/>
-    <p:sldId id="1829" r:id="rId30"/>
-    <p:sldId id="1833" r:id="rId31"/>
-    <p:sldId id="1831" r:id="rId32"/>
-    <p:sldId id="1842" r:id="rId33"/>
-    <p:sldId id="1830" r:id="rId34"/>
-    <p:sldId id="313" r:id="rId35"/>
+    <p:sldId id="1845" r:id="rId26"/>
+    <p:sldId id="1844" r:id="rId27"/>
+    <p:sldId id="1836" r:id="rId28"/>
+    <p:sldId id="1837" r:id="rId29"/>
+    <p:sldId id="1832" r:id="rId30"/>
+    <p:sldId id="1829" r:id="rId31"/>
+    <p:sldId id="1833" r:id="rId32"/>
+    <p:sldId id="1831" r:id="rId33"/>
+    <p:sldId id="1842" r:id="rId34"/>
+    <p:sldId id="1830" r:id="rId35"/>
+    <p:sldId id="313" r:id="rId36"/>
   </p:sldIdLst>
   <p:sldSz cx="12188825" cy="6858000"/>
   <p:notesSz cx="7010400" cy="9296400"/>
@@ -285,7 +286,7 @@
           <a:p>
             <a:fld id="{0B842F42-2CE9-4E35-95C1-410DC08A50B1}" type="datetimeFigureOut">
               <a:rPr lang="en-US" smtClean="0"/>
-              <a:t>6/16/2021</a:t>
+              <a:t>8/8/2021</a:t>
             </a:fld>
             <a:endParaRPr lang="en-US"/>
           </a:p>
@@ -450,7 +451,7 @@
           <a:p>
             <a:fld id="{6F282904-F315-4730-8D91-37D99E141A6F}" type="datetimeFigureOut">
               <a:rPr lang="en-US" smtClean="0"/>
-              <a:t>6/16/2021</a:t>
+              <a:t>8/8/2021</a:t>
             </a:fld>
             <a:endParaRPr lang="en-US"/>
           </a:p>
@@ -1443,7 +1444,7 @@
           <a:p>
             <a:fld id="{54E672D7-8E2D-4611-973D-F4591A707C34}" type="slidenum">
               <a:rPr lang="en-US" smtClean="0"/>
-              <a:t>26</a:t>
+              <a:t>27</a:t>
             </a:fld>
             <a:endParaRPr lang="en-US"/>
           </a:p>
@@ -1527,7 +1528,7 @@
           <a:p>
             <a:fld id="{54E672D7-8E2D-4611-973D-F4591A707C34}" type="slidenum">
               <a:rPr lang="en-US" smtClean="0"/>
-              <a:t>28</a:t>
+              <a:t>29</a:t>
             </a:fld>
             <a:endParaRPr lang="en-US"/>
           </a:p>
@@ -4977,7 +4978,7 @@
             </a:pPr>
             <a:r>
               <a:rPr lang="en-US" sz="2000" dirty="0"/>
-              <a:t>Better Scientific Software tutorial, ISC, June 2021</a:t>
+              <a:t>Software Productivity and Sustainability track, ATPESC 2021</a:t>
             </a:r>
           </a:p>
           <a:p>
@@ -5126,7 +5127,7 @@
           <a:p>
             <a:r>
               <a:rPr lang="en-US" dirty="0"/>
-              <a:t>(Additional) Incentives for Paying Attention to Reproducibility</a:t>
+              <a:t>Incentives for Paying Attention to Reproducibility</a:t>
             </a:r>
           </a:p>
         </p:txBody>
@@ -5195,6 +5196,15 @@
             <a:r>
               <a:rPr lang="en-US" dirty="0"/>
               <a:t>: Change incentives to include valuing of better software, better science</a:t>
+            </a:r>
+          </a:p>
+          <a:p>
+            <a:pPr marL="0" indent="0">
+              <a:buNone/>
+            </a:pPr>
+            <a:r>
+              <a:rPr lang="en-US" dirty="0"/>
+              <a:t>This is a long-term goal, requiring a culture change in (computational) science which in the early stages</a:t>
             </a:r>
           </a:p>
           <a:p>
@@ -8040,7 +8050,7 @@
             </a:r>
             <a:r>
               <a:rPr lang="en-US" dirty="0"/>
-              <a:t> (1/2)</a:t>
+              <a:t> (1/3)</a:t>
             </a:r>
           </a:p>
         </p:txBody>
@@ -8216,7 +8226,7 @@
             </a:r>
             <a:r>
               <a:rPr lang="en-US" dirty="0"/>
-              <a:t> (2/2)</a:t>
+              <a:t> (2/3)</a:t>
             </a:r>
           </a:p>
         </p:txBody>
@@ -8435,7 +8445,12 @@
             <p:ph type="title"/>
           </p:nvPr>
         </p:nvSpPr>
-        <p:spPr/>
+        <p:spPr>
+          <a:xfrm>
+            <a:off x="365760" y="411480"/>
+            <a:ext cx="11457305" cy="914400"/>
+          </a:xfrm>
+        </p:spPr>
         <p:txBody>
           <a:bodyPr/>
           <a:lstStyle/>
@@ -8446,11 +8461,15 @@
             </a:r>
             <a:r>
               <a:rPr lang="en-US" i="1" u="sng" dirty="0"/>
-              <a:t>After</a:t>
+              <a:t>During</a:t>
             </a:r>
             <a:r>
               <a:rPr lang="en-US" u="sng" dirty="0"/>
               <a:t> Development</a:t>
+            </a:r>
+            <a:r>
+              <a:rPr lang="en-US" dirty="0"/>
+              <a:t> (3/3)</a:t>
             </a:r>
           </a:p>
         </p:txBody>
@@ -8473,7 +8492,7 @@
         </p:nvSpPr>
         <p:spPr>
           <a:xfrm>
-            <a:off x="365760" y="919426"/>
+            <a:off x="365760" y="995355"/>
             <a:ext cx="11369809" cy="4047778"/>
           </a:xfrm>
         </p:spPr>
@@ -8482,18 +8501,39 @@
           <a:lstStyle/>
           <a:p>
             <a:r>
-              <a:rPr lang="en-US" sz="2000" b="1" dirty="0">
+              <a:rPr lang="en-US" b="1" dirty="0">
                 <a:solidFill>
                   <a:schemeClr val="tx2"/>
                 </a:solidFill>
               </a:rPr>
-              <a:t>Testing, testing, and more testing!</a:t>
-            </a:r>
-          </a:p>
-          <a:p>
-            <a:r>
-              <a:rPr lang="en-US" sz="2000" dirty="0"/>
-              <a:t>Add “regression tests”</a:t>
+              <a:t>Understand the </a:t>
+            </a:r>
+            <a:r>
+              <a:rPr lang="en-US" b="1" dirty="0" err="1">
+                <a:solidFill>
+                  <a:schemeClr val="tx2"/>
+                </a:solidFill>
+              </a:rPr>
+              <a:t>numerics</a:t>
+            </a:r>
+            <a:r>
+              <a:rPr lang="en-US" b="1" dirty="0">
+                <a:solidFill>
+                  <a:schemeClr val="tx2"/>
+                </a:solidFill>
+              </a:rPr>
+              <a:t> of your code</a:t>
+            </a:r>
+          </a:p>
+          <a:p>
+            <a:pPr>
+              <a:spcBef>
+                <a:spcPts val="800"/>
+              </a:spcBef>
+            </a:pPr>
+            <a:r>
+              <a:rPr lang="en-US" dirty="0"/>
+              <a:t>Floating point numbers are just approximations to real numbers</a:t>
             </a:r>
           </a:p>
           <a:p>
@@ -8503,14 +8543,19 @@
               </a:spcBef>
             </a:pPr>
             <a:r>
-              <a:rPr lang="en-US" sz="1800" dirty="0"/>
-              <a:t>If you fix a bug, add a test to make sure that bug doesn’t creep back in</a:t>
-            </a:r>
-          </a:p>
-          <a:p>
-            <a:r>
-              <a:rPr lang="en-US" sz="2000" dirty="0"/>
-              <a:t>Add more tests</a:t>
+              <a:rPr lang="en-US" dirty="0"/>
+              <a:t>Many numerical methods have “quirks” too</a:t>
+            </a:r>
+          </a:p>
+          <a:p>
+            <a:pPr>
+              <a:spcBef>
+                <a:spcPts val="800"/>
+              </a:spcBef>
+            </a:pPr>
+            <a:r>
+              <a:rPr lang="en-US" dirty="0"/>
+              <a:t>If you’re using reduced- or mixed-precision computations, carefully compare with full-precision versions</a:t>
             </a:r>
           </a:p>
           <a:p>
@@ -8520,8 +8565,8 @@
               </a:spcBef>
             </a:pPr>
             <a:r>
-              <a:rPr lang="en-US" sz="1800" dirty="0"/>
-              <a:t>Be creative</a:t>
+              <a:rPr lang="en-US" dirty="0"/>
+              <a:t>On paper during development of the algorithms</a:t>
             </a:r>
           </a:p>
           <a:p>
@@ -8531,8 +8576,19 @@
               </a:spcBef>
             </a:pPr>
             <a:r>
-              <a:rPr lang="en-US" sz="1800" dirty="0"/>
-              <a:t>Think about common cases, then corner cases</a:t>
+              <a:rPr lang="en-US" dirty="0"/>
+              <a:t>Maybe provide an alternative full-precision computational path </a:t>
+            </a:r>
+          </a:p>
+          <a:p>
+            <a:pPr>
+              <a:spcBef>
+                <a:spcPts val="800"/>
+              </a:spcBef>
+            </a:pPr>
+            <a:r>
+              <a:rPr lang="en-US" dirty="0"/>
+              <a:t>Consider the possible effects of non-determinism due to concurrency</a:t>
             </a:r>
           </a:p>
           <a:p>
@@ -8542,8 +8598,8 @@
               </a:spcBef>
             </a:pPr>
             <a:r>
-              <a:rPr lang="en-US" sz="1800" dirty="0"/>
-              <a:t>Think about misuse (unintentional or intentional)</a:t>
+              <a:rPr lang="en-US" dirty="0"/>
+              <a:t>Floating point calculations done in different order may yield different results</a:t>
             </a:r>
           </a:p>
           <a:p>
@@ -8553,8 +8609,8 @@
               </a:spcBef>
             </a:pPr>
             <a:r>
-              <a:rPr lang="en-US" sz="1800" dirty="0"/>
-              <a:t>Think about synthetic tests with synthetic data</a:t>
+              <a:rPr lang="en-US" dirty="0"/>
+              <a:t>Maybe useful to have an option to force deterministic computation</a:t>
             </a:r>
           </a:p>
           <a:p>
@@ -8564,8 +8620,19 @@
               </a:spcBef>
             </a:pPr>
             <a:r>
-              <a:rPr lang="en-US" sz="1800" dirty="0"/>
-              <a:t>Think about low-cost tests that can be “always on” (even if they’re not so stringent)</a:t>
+              <a:rPr lang="en-US" dirty="0"/>
+              <a:t>Look for testing/verification methods that don’t depend on bitwise reproducibility</a:t>
+            </a:r>
+          </a:p>
+          <a:p>
+            <a:pPr>
+              <a:spcBef>
+                <a:spcPts val="800"/>
+              </a:spcBef>
+            </a:pPr>
+            <a:r>
+              <a:rPr lang="en-US" dirty="0"/>
+              <a:t>Know your error bounds and develop tests against them</a:t>
             </a:r>
           </a:p>
           <a:p>
@@ -8575,77 +8642,19 @@
               </a:spcBef>
             </a:pPr>
             <a:r>
-              <a:rPr lang="en-US" sz="1800" dirty="0"/>
-              <a:t>Can you detect silent data corruption?</a:t>
-            </a:r>
-          </a:p>
-          <a:p>
-            <a:r>
-              <a:rPr lang="en-US" sz="2000" dirty="0"/>
-              <a:t>Test your tests!</a:t>
-            </a:r>
-          </a:p>
-          <a:p>
-            <a:pPr lvl="1">
-              <a:spcBef>
-                <a:spcPts val="200"/>
-              </a:spcBef>
-            </a:pPr>
-            <a:r>
-              <a:rPr lang="en-US" sz="1800" dirty="0"/>
-              <a:t>Make sure tests fail when they’re supposed to!</a:t>
-            </a:r>
-          </a:p>
-          <a:p>
-            <a:r>
-              <a:rPr lang="en-US" sz="2000" dirty="0"/>
-              <a:t>Thoroughly verify the code</a:t>
-            </a:r>
-          </a:p>
-          <a:p>
-            <a:pPr lvl="1">
-              <a:spcBef>
-                <a:spcPts val="200"/>
-              </a:spcBef>
-            </a:pPr>
-            <a:r>
-              <a:rPr lang="en-US" sz="1800" dirty="0"/>
-              <a:t>Does the code do what you intended it to do?</a:t>
-            </a:r>
-          </a:p>
-          <a:p>
-            <a:pPr lvl="1">
-              <a:spcBef>
-                <a:spcPts val="200"/>
-              </a:spcBef>
-            </a:pPr>
-            <a:r>
-              <a:rPr lang="en-US" sz="1800" dirty="0"/>
-              <a:t>On all relevant platforms (compilers, hardware, etc.)</a:t>
-            </a:r>
-          </a:p>
-          <a:p>
-            <a:r>
-              <a:rPr lang="en-US" sz="2000" dirty="0"/>
-              <a:t>Test regularly</a:t>
-            </a:r>
-          </a:p>
-          <a:p>
-            <a:pPr lvl="1">
-              <a:spcBef>
-                <a:spcPts val="200"/>
-              </a:spcBef>
-            </a:pPr>
-            <a:r>
-              <a:rPr lang="en-US" sz="1800" dirty="0"/>
-              <a:t>To identify and document where changes to the underlying </a:t>
-            </a:r>
-            <a:br>
-              <a:rPr lang="en-US" sz="1800" dirty="0"/>
-            </a:br>
-            <a:r>
-              <a:rPr lang="en-US" sz="1800" dirty="0"/>
-              <a:t>platform change code behavior/results</a:t>
+              <a:rPr lang="en-US" dirty="0"/>
+              <a:t>E.g., conservation rules apply to many physical quantities</a:t>
+            </a:r>
+          </a:p>
+          <a:p>
+            <a:pPr>
+              <a:spcBef>
+                <a:spcPts val="800"/>
+              </a:spcBef>
+            </a:pPr>
+            <a:r>
+              <a:rPr lang="en-US" dirty="0"/>
+              <a:t>Consider consulting subject matter experts for help</a:t>
             </a:r>
           </a:p>
         </p:txBody>
@@ -8653,7 +8662,7 @@
     </p:spTree>
     <p:extLst>
       <p:ext uri="{BB962C8B-B14F-4D97-AF65-F5344CB8AC3E}">
-        <p14:creationId xmlns:p14="http://schemas.microsoft.com/office/powerpoint/2010/main" val="1368771477"/>
+        <p14:creationId xmlns:p14="http://schemas.microsoft.com/office/powerpoint/2010/main" val="184948764"/>
       </p:ext>
     </p:extLst>
   </p:cSld>
@@ -8664,6 +8673,339 @@
 </file>
 
 <file path=ppt/slides/slide23.xml><?xml version="1.0" encoding="utf-8"?>
+<p:sld xmlns:a="http://schemas.openxmlformats.org/drawingml/2006/main" xmlns:r="http://schemas.openxmlformats.org/officeDocument/2006/relationships" xmlns:p="http://schemas.openxmlformats.org/presentationml/2006/main">
+  <p:cSld>
+    <p:spTree>
+      <p:nvGrpSpPr>
+        <p:cNvPr id="1" name=""/>
+        <p:cNvGrpSpPr/>
+        <p:nvPr/>
+      </p:nvGrpSpPr>
+      <p:grpSpPr>
+        <a:xfrm>
+          <a:off x="0" y="0"/>
+          <a:ext cx="0" cy="0"/>
+          <a:chOff x="0" y="0"/>
+          <a:chExt cx="0" cy="0"/>
+        </a:xfrm>
+      </p:grpSpPr>
+      <p:sp>
+        <p:nvSpPr>
+          <p:cNvPr id="2" name="Title 1">
+            <a:extLst>
+              <a:ext uri="{FF2B5EF4-FFF2-40B4-BE49-F238E27FC236}">
+                <a16:creationId xmlns:a16="http://schemas.microsoft.com/office/drawing/2014/main" id="{AF0E5AE6-BAC5-4D3D-B274-228B336C1693}"/>
+              </a:ext>
+            </a:extLst>
+          </p:cNvPr>
+          <p:cNvSpPr>
+            <a:spLocks noGrp="1"/>
+          </p:cNvSpPr>
+          <p:nvPr>
+            <p:ph type="title"/>
+          </p:nvPr>
+        </p:nvSpPr>
+        <p:spPr/>
+        <p:txBody>
+          <a:bodyPr/>
+          <a:lstStyle/>
+          <a:p>
+            <a:r>
+              <a:rPr lang="en-US" dirty="0"/>
+              <a:t>Strategies for Improving Reproducibility </a:t>
+            </a:r>
+            <a:r>
+              <a:rPr lang="en-US" i="1" u="sng" dirty="0"/>
+              <a:t>After</a:t>
+            </a:r>
+            <a:r>
+              <a:rPr lang="en-US" u="sng" dirty="0"/>
+              <a:t> Development</a:t>
+            </a:r>
+          </a:p>
+        </p:txBody>
+      </p:sp>
+      <p:sp>
+        <p:nvSpPr>
+          <p:cNvPr id="3" name="Content Placeholder 2">
+            <a:extLst>
+              <a:ext uri="{FF2B5EF4-FFF2-40B4-BE49-F238E27FC236}">
+                <a16:creationId xmlns:a16="http://schemas.microsoft.com/office/drawing/2014/main" id="{7E3F8F1F-5081-4F6E-81DA-DC14088609D1}"/>
+              </a:ext>
+            </a:extLst>
+          </p:cNvPr>
+          <p:cNvSpPr>
+            <a:spLocks noGrp="1"/>
+          </p:cNvSpPr>
+          <p:nvPr>
+            <p:ph sz="half" idx="2"/>
+          </p:nvPr>
+        </p:nvSpPr>
+        <p:spPr>
+          <a:xfrm>
+            <a:off x="457200" y="1114436"/>
+            <a:ext cx="5588582" cy="3373229"/>
+          </a:xfrm>
+          <a:ln>
+            <a:noFill/>
+          </a:ln>
+        </p:spPr>
+        <p:txBody>
+          <a:bodyPr/>
+          <a:lstStyle/>
+          <a:p>
+            <a:r>
+              <a:rPr lang="en-US" sz="2000" b="1" dirty="0">
+                <a:solidFill>
+                  <a:schemeClr val="tx2"/>
+                </a:solidFill>
+              </a:rPr>
+              <a:t>Testing, testing, and more testing!</a:t>
+            </a:r>
+          </a:p>
+          <a:p>
+            <a:r>
+              <a:rPr lang="en-US" sz="2000" dirty="0"/>
+              <a:t>Add “regression tests”</a:t>
+            </a:r>
+          </a:p>
+          <a:p>
+            <a:pPr lvl="1">
+              <a:spcBef>
+                <a:spcPts val="200"/>
+              </a:spcBef>
+            </a:pPr>
+            <a:r>
+              <a:rPr lang="en-US" sz="1800" dirty="0"/>
+              <a:t>If you fix a bug, add a test to make sure that bug doesn’t creep back in</a:t>
+            </a:r>
+          </a:p>
+          <a:p>
+            <a:r>
+              <a:rPr lang="en-US" sz="2000" dirty="0"/>
+              <a:t>Add more tests</a:t>
+            </a:r>
+          </a:p>
+          <a:p>
+            <a:pPr lvl="1">
+              <a:spcBef>
+                <a:spcPts val="200"/>
+              </a:spcBef>
+            </a:pPr>
+            <a:r>
+              <a:rPr lang="en-US" sz="1800" dirty="0"/>
+              <a:t>Be creative</a:t>
+            </a:r>
+          </a:p>
+          <a:p>
+            <a:pPr lvl="1">
+              <a:spcBef>
+                <a:spcPts val="200"/>
+              </a:spcBef>
+            </a:pPr>
+            <a:r>
+              <a:rPr lang="en-US" sz="1800" dirty="0"/>
+              <a:t>Think about common cases, then corner cases</a:t>
+            </a:r>
+          </a:p>
+          <a:p>
+            <a:pPr lvl="1">
+              <a:spcBef>
+                <a:spcPts val="200"/>
+              </a:spcBef>
+            </a:pPr>
+            <a:r>
+              <a:rPr lang="en-US" sz="1800" dirty="0"/>
+              <a:t>Think about misuse (unintentional or intentional)</a:t>
+            </a:r>
+          </a:p>
+          <a:p>
+            <a:pPr lvl="1">
+              <a:spcBef>
+                <a:spcPts val="200"/>
+              </a:spcBef>
+            </a:pPr>
+            <a:r>
+              <a:rPr lang="en-US" sz="1800" dirty="0"/>
+              <a:t>Think about synthetic tests with synthetic data</a:t>
+            </a:r>
+          </a:p>
+          <a:p>
+            <a:pPr lvl="1">
+              <a:spcBef>
+                <a:spcPts val="200"/>
+              </a:spcBef>
+            </a:pPr>
+            <a:r>
+              <a:rPr lang="en-US" sz="1800" dirty="0"/>
+              <a:t>Think about low-cost tests that can be “always on” (even if they’re not so stringent)</a:t>
+            </a:r>
+          </a:p>
+          <a:p>
+            <a:pPr lvl="1">
+              <a:spcBef>
+                <a:spcPts val="200"/>
+              </a:spcBef>
+            </a:pPr>
+            <a:r>
+              <a:rPr lang="en-US" sz="1800" dirty="0"/>
+              <a:t>Can you detect silent data corruption?</a:t>
+            </a:r>
+          </a:p>
+        </p:txBody>
+      </p:sp>
+      <p:sp>
+        <p:nvSpPr>
+          <p:cNvPr id="6" name="Content Placeholder 5">
+            <a:extLst>
+              <a:ext uri="{FF2B5EF4-FFF2-40B4-BE49-F238E27FC236}">
+                <a16:creationId xmlns:a16="http://schemas.microsoft.com/office/drawing/2014/main" id="{A6E0D8FD-9F37-4AB6-A176-A8A84426CC7A}"/>
+              </a:ext>
+            </a:extLst>
+          </p:cNvPr>
+          <p:cNvSpPr>
+            <a:spLocks noGrp="1"/>
+          </p:cNvSpPr>
+          <p:nvPr>
+            <p:ph sz="quarter" idx="4"/>
+          </p:nvPr>
+        </p:nvSpPr>
+        <p:spPr>
+          <a:xfrm>
+            <a:off x="6218914" y="1114436"/>
+            <a:ext cx="5531934" cy="3373229"/>
+          </a:xfrm>
+          <a:ln>
+            <a:noFill/>
+          </a:ln>
+        </p:spPr>
+        <p:txBody>
+          <a:bodyPr/>
+          <a:lstStyle/>
+          <a:p>
+            <a:r>
+              <a:rPr lang="en-US" sz="2000" dirty="0"/>
+              <a:t>Test your third-party dependencies</a:t>
+            </a:r>
+          </a:p>
+          <a:p>
+            <a:pPr lvl="1">
+              <a:spcBef>
+                <a:spcPts val="200"/>
+              </a:spcBef>
+            </a:pPr>
+            <a:r>
+              <a:rPr lang="en-US" dirty="0"/>
+              <a:t>Are your tools doing what you think they’re doing?</a:t>
+            </a:r>
+          </a:p>
+          <a:p>
+            <a:pPr lvl="1">
+              <a:spcBef>
+                <a:spcPts val="200"/>
+              </a:spcBef>
+            </a:pPr>
+            <a:r>
+              <a:rPr lang="en-US" dirty="0"/>
+              <a:t>What if you’re using a new version?</a:t>
+            </a:r>
+          </a:p>
+          <a:p>
+            <a:pPr lvl="1">
+              <a:spcBef>
+                <a:spcPts val="200"/>
+              </a:spcBef>
+            </a:pPr>
+            <a:r>
+              <a:rPr lang="en-US" dirty="0"/>
+              <a:t>How do you decide if it is okay to upgrade to a new version?</a:t>
+            </a:r>
+          </a:p>
+          <a:p>
+            <a:r>
+              <a:rPr lang="en-US" sz="2000" dirty="0"/>
+              <a:t>Test your tests!</a:t>
+            </a:r>
+          </a:p>
+          <a:p>
+            <a:pPr lvl="1">
+              <a:spcBef>
+                <a:spcPts val="200"/>
+              </a:spcBef>
+            </a:pPr>
+            <a:r>
+              <a:rPr lang="en-US" sz="1800" dirty="0"/>
+              <a:t>Make sure tests fail when they’re supposed to!</a:t>
+            </a:r>
+          </a:p>
+          <a:p>
+            <a:r>
+              <a:rPr lang="en-US" sz="2000" dirty="0"/>
+              <a:t>Thoroughly verify the code</a:t>
+            </a:r>
+          </a:p>
+          <a:p>
+            <a:pPr lvl="1">
+              <a:spcBef>
+                <a:spcPts val="200"/>
+              </a:spcBef>
+            </a:pPr>
+            <a:r>
+              <a:rPr lang="en-US" sz="1800" dirty="0"/>
+              <a:t>Does the code do what you intended it to do?</a:t>
+            </a:r>
+          </a:p>
+          <a:p>
+            <a:pPr lvl="1">
+              <a:spcBef>
+                <a:spcPts val="200"/>
+              </a:spcBef>
+            </a:pPr>
+            <a:r>
+              <a:rPr lang="en-US" sz="1800" dirty="0"/>
+              <a:t>On all relevant platforms (compilers, hardware, etc.)</a:t>
+            </a:r>
+          </a:p>
+          <a:p>
+            <a:r>
+              <a:rPr lang="en-US" sz="2000" dirty="0"/>
+              <a:t>Test regularly</a:t>
+            </a:r>
+          </a:p>
+          <a:p>
+            <a:pPr lvl="1">
+              <a:spcBef>
+                <a:spcPts val="200"/>
+              </a:spcBef>
+            </a:pPr>
+            <a:r>
+              <a:rPr lang="en-US" sz="1800" dirty="0"/>
+              <a:t>To identify and document where changes to the underlying </a:t>
+            </a:r>
+            <a:br>
+              <a:rPr lang="en-US" sz="1800" dirty="0"/>
+            </a:br>
+            <a:r>
+              <a:rPr lang="en-US" sz="1800" dirty="0"/>
+              <a:t>platform change code behavior/results</a:t>
+            </a:r>
+          </a:p>
+        </p:txBody>
+      </p:sp>
+    </p:spTree>
+    <p:extLst>
+      <p:ext uri="{BB962C8B-B14F-4D97-AF65-F5344CB8AC3E}">
+        <p14:creationId xmlns:p14="http://schemas.microsoft.com/office/powerpoint/2010/main" val="2253672400"/>
+      </p:ext>
+    </p:extLst>
+  </p:cSld>
+  <p:clrMapOvr>
+    <a:masterClrMapping/>
+  </p:clrMapOvr>
+</p:sld>
+</file>
+
+<file path=ppt/slides/slide24.xml><?xml version="1.0" encoding="utf-8"?>
 <p:sld xmlns:a="http://schemas.openxmlformats.org/drawingml/2006/main" xmlns:r="http://schemas.openxmlformats.org/officeDocument/2006/relationships" xmlns:p="http://schemas.openxmlformats.org/presentationml/2006/main">
   <p:cSld>
     <p:spTree>
@@ -8824,7 +9166,7 @@
 </p:sld>
 </file>
 
-<file path=ppt/slides/slide24.xml><?xml version="1.0" encoding="utf-8"?>
+<file path=ppt/slides/slide25.xml><?xml version="1.0" encoding="utf-8"?>
 <p:sld xmlns:a="http://schemas.openxmlformats.org/drawingml/2006/main" xmlns:r="http://schemas.openxmlformats.org/officeDocument/2006/relationships" xmlns:p="http://schemas.openxmlformats.org/presentationml/2006/main">
   <p:cSld>
     <p:spTree>
@@ -9079,202 +9421,6 @@
     <p:extLst>
       <p:ext uri="{BB962C8B-B14F-4D97-AF65-F5344CB8AC3E}">
         <p14:creationId xmlns:p14="http://schemas.microsoft.com/office/powerpoint/2010/main" val="2645307942"/>
-      </p:ext>
-    </p:extLst>
-  </p:cSld>
-  <p:clrMapOvr>
-    <a:masterClrMapping/>
-  </p:clrMapOvr>
-</p:sld>
-</file>
-
-<file path=ppt/slides/slide25.xml><?xml version="1.0" encoding="utf-8"?>
-<p:sld xmlns:a="http://schemas.openxmlformats.org/drawingml/2006/main" xmlns:r="http://schemas.openxmlformats.org/officeDocument/2006/relationships" xmlns:p="http://schemas.openxmlformats.org/presentationml/2006/main">
-  <p:cSld>
-    <p:spTree>
-      <p:nvGrpSpPr>
-        <p:cNvPr id="1" name=""/>
-        <p:cNvGrpSpPr/>
-        <p:nvPr/>
-      </p:nvGrpSpPr>
-      <p:grpSpPr>
-        <a:xfrm>
-          <a:off x="0" y="0"/>
-          <a:ext cx="0" cy="0"/>
-          <a:chOff x="0" y="0"/>
-          <a:chExt cx="0" cy="0"/>
-        </a:xfrm>
-      </p:grpSpPr>
-      <p:sp>
-        <p:nvSpPr>
-          <p:cNvPr id="2" name="Title 1">
-            <a:extLst>
-              <a:ext uri="{FF2B5EF4-FFF2-40B4-BE49-F238E27FC236}">
-                <a16:creationId xmlns:a16="http://schemas.microsoft.com/office/drawing/2014/main" id="{AF0E5AE6-BAC5-4D3D-B274-228B336C1693}"/>
-              </a:ext>
-            </a:extLst>
-          </p:cNvPr>
-          <p:cNvSpPr>
-            <a:spLocks noGrp="1"/>
-          </p:cNvSpPr>
-          <p:nvPr>
-            <p:ph type="title"/>
-          </p:nvPr>
-        </p:nvSpPr>
-        <p:spPr/>
-        <p:txBody>
-          <a:bodyPr/>
-          <a:lstStyle/>
-          <a:p>
-            <a:r>
-              <a:rPr lang="en-US" dirty="0"/>
-              <a:t>Strategies for Improving Reproducibility </a:t>
-            </a:r>
-            <a:r>
-              <a:rPr lang="en-US" i="1" u="sng" dirty="0"/>
-              <a:t>During</a:t>
-            </a:r>
-            <a:r>
-              <a:rPr lang="en-US" u="sng" dirty="0"/>
-              <a:t> Experiments</a:t>
-            </a:r>
-            <a:r>
-              <a:rPr lang="en-US" dirty="0"/>
-              <a:t> (1/3)</a:t>
-            </a:r>
-          </a:p>
-        </p:txBody>
-      </p:sp>
-      <p:sp>
-        <p:nvSpPr>
-          <p:cNvPr id="3" name="Content Placeholder 2">
-            <a:extLst>
-              <a:ext uri="{FF2B5EF4-FFF2-40B4-BE49-F238E27FC236}">
-                <a16:creationId xmlns:a16="http://schemas.microsoft.com/office/drawing/2014/main" id="{7E3F8F1F-5081-4F6E-81DA-DC14088609D1}"/>
-              </a:ext>
-            </a:extLst>
-          </p:cNvPr>
-          <p:cNvSpPr>
-            <a:spLocks noGrp="1"/>
-          </p:cNvSpPr>
-          <p:nvPr>
-            <p:ph idx="1"/>
-          </p:nvPr>
-        </p:nvSpPr>
-        <p:spPr>
-          <a:xfrm>
-            <a:off x="365760" y="982589"/>
-            <a:ext cx="11369809" cy="4047778"/>
-          </a:xfrm>
-        </p:spPr>
-        <p:txBody>
-          <a:bodyPr/>
-          <a:lstStyle/>
-          <a:p>
-            <a:r>
-              <a:rPr lang="en-US" b="1" dirty="0">
-                <a:solidFill>
-                  <a:schemeClr val="tx2"/>
-                </a:solidFill>
-              </a:rPr>
-              <a:t>What are you going to do, why, and how?</a:t>
-            </a:r>
-          </a:p>
-          <a:p>
-            <a:r>
-              <a:rPr lang="en-US" dirty="0"/>
-              <a:t>Plan your experiments thoroughly</a:t>
-            </a:r>
-          </a:p>
-          <a:p>
-            <a:pPr lvl="1"/>
-            <a:r>
-              <a:rPr lang="en-US" dirty="0"/>
-              <a:t>If you’re in a team, designate </a:t>
-            </a:r>
-            <a:r>
-              <a:rPr lang="en-US" i="1" dirty="0"/>
-              <a:t>one</a:t>
-            </a:r>
-            <a:r>
-              <a:rPr lang="en-US" dirty="0"/>
-              <a:t> person to coordinate the experimental campaign</a:t>
-            </a:r>
-          </a:p>
-          <a:p>
-            <a:pPr lvl="1"/>
-            <a:r>
-              <a:rPr lang="en-US" dirty="0"/>
-              <a:t>Know what you need (in the code, as inputs, as outputs to capture/analyze, etc.)</a:t>
-            </a:r>
-          </a:p>
-          <a:p>
-            <a:pPr lvl="1"/>
-            <a:r>
-              <a:rPr lang="en-US" dirty="0"/>
-              <a:t>Know how you’re going to process or analyze the results</a:t>
-            </a:r>
-          </a:p>
-          <a:p>
-            <a:pPr lvl="1"/>
-            <a:r>
-              <a:rPr lang="en-US" dirty="0"/>
-              <a:t>Know what to expect (in results, performance/cost, etc.)</a:t>
-            </a:r>
-          </a:p>
-          <a:p>
-            <a:pPr lvl="1"/>
-            <a:r>
-              <a:rPr lang="en-US" dirty="0"/>
-              <a:t>How will you convince yourself that your results are trustworthy?</a:t>
-            </a:r>
-          </a:p>
-          <a:p>
-            <a:r>
-              <a:rPr lang="en-US" dirty="0"/>
-              <a:t>Perform pilot/test runs to build confidence in correctness, performance, scaling</a:t>
-            </a:r>
-          </a:p>
-          <a:p>
-            <a:pPr lvl="1"/>
-            <a:r>
-              <a:rPr lang="en-US" dirty="0"/>
-              <a:t>Often useful to pursue an incremental/layered strategy</a:t>
-            </a:r>
-          </a:p>
-          <a:p>
-            <a:r>
-              <a:rPr lang="en-US" dirty="0"/>
-              <a:t>Ensure that you have the resources to store and/or analyze the outputs</a:t>
-            </a:r>
-          </a:p>
-          <a:p>
-            <a:pPr lvl="1"/>
-            <a:r>
-              <a:rPr lang="en-US" dirty="0"/>
-              <a:t>What can you afford to archive?</a:t>
-            </a:r>
-          </a:p>
-          <a:p>
-            <a:pPr lvl="1"/>
-            <a:r>
-              <a:rPr lang="en-US" dirty="0"/>
-              <a:t>What will you need to process and delete?</a:t>
-            </a:r>
-          </a:p>
-          <a:p>
-            <a:pPr lvl="1"/>
-            <a:r>
-              <a:rPr lang="en-US" dirty="0"/>
-              <a:t>What will you need to process during execution or stream?</a:t>
-            </a:r>
-          </a:p>
-        </p:txBody>
-      </p:sp>
-    </p:spTree>
-    <p:extLst>
-      <p:ext uri="{BB962C8B-B14F-4D97-AF65-F5344CB8AC3E}">
-        <p14:creationId xmlns:p14="http://schemas.microsoft.com/office/powerpoint/2010/main" val="3488834746"/>
       </p:ext>
     </p:extLst>
   </p:cSld>
@@ -9336,9 +9482,8 @@
             </a:r>
             <a:r>
               <a:rPr lang="en-US" dirty="0"/>
-              <a:t> (2/3)</a:t>
-            </a:r>
-            <a:endParaRPr lang="en-US" u="sng" dirty="0"/>
+              <a:t> (1/3)</a:t>
+            </a:r>
           </a:p>
         </p:txBody>
       </p:sp>
@@ -9360,8 +9505,8 @@
         </p:nvSpPr>
         <p:spPr>
           <a:xfrm>
-            <a:off x="365760" y="1280165"/>
-            <a:ext cx="11534052" cy="4047778"/>
+            <a:off x="365760" y="982589"/>
+            <a:ext cx="11369809" cy="4047778"/>
           </a:xfrm>
         </p:spPr>
         <p:txBody>
@@ -9374,134 +9519,96 @@
                   <a:schemeClr val="tx2"/>
                 </a:solidFill>
               </a:rPr>
-              <a:t>Can you reproduce the code used for each and every experiment?</a:t>
-            </a:r>
-          </a:p>
-          <a:p>
-            <a:pPr lvl="1">
-              <a:spcBef>
-                <a:spcPts val="200"/>
-              </a:spcBef>
-            </a:pPr>
-            <a:r>
-              <a:rPr lang="en-US" b="1" dirty="0">
-                <a:solidFill>
-                  <a:schemeClr val="tx2"/>
-                </a:solidFill>
-              </a:rPr>
-              <a:t>Three years later?</a:t>
-            </a:r>
-          </a:p>
-          <a:p>
-            <a:r>
-              <a:rPr lang="en-US" dirty="0"/>
-              <a:t>Use only well-defined versions of code (i.e., official “releases”, tags, etc.)</a:t>
-            </a:r>
-          </a:p>
-          <a:p>
-            <a:pPr lvl="1">
-              <a:spcBef>
-                <a:spcPts val="200"/>
-              </a:spcBef>
-            </a:pPr>
-            <a:r>
-              <a:rPr lang="en-US" dirty="0"/>
-              <a:t>Master or development branches are often moving targets</a:t>
-            </a:r>
-          </a:p>
-          <a:p>
-            <a:pPr lvl="1">
-              <a:spcBef>
-                <a:spcPts val="200"/>
-              </a:spcBef>
-            </a:pPr>
-            <a:r>
-              <a:rPr lang="en-US" dirty="0"/>
-              <a:t>Capture the exact version of the code used for each experiment</a:t>
-            </a:r>
-          </a:p>
-          <a:p>
-            <a:pPr lvl="2">
-              <a:spcBef>
-                <a:spcPts val="200"/>
-              </a:spcBef>
-            </a:pPr>
-            <a:r>
-              <a:rPr lang="en-US" dirty="0"/>
-              <a:t>Is the code you’re building exactly what’s in the version control repo?</a:t>
-            </a:r>
-          </a:p>
-          <a:p>
-            <a:pPr lvl="1">
-              <a:spcBef>
-                <a:spcPts val="200"/>
-              </a:spcBef>
-            </a:pPr>
-            <a:r>
-              <a:rPr lang="en-US" dirty="0"/>
-              <a:t>Don’t change versions during a related series of experiments (unless you have to)</a:t>
-            </a:r>
-          </a:p>
-          <a:p>
-            <a:pPr lvl="1">
-              <a:spcBef>
-                <a:spcPts val="200"/>
-              </a:spcBef>
-            </a:pPr>
-            <a:r>
-              <a:rPr lang="en-US" dirty="0"/>
-              <a:t>If you have to change versions, know exactly what changed</a:t>
-            </a:r>
-          </a:p>
-          <a:p>
-            <a:pPr lvl="2">
-              <a:spcBef>
-                <a:spcPts val="200"/>
-              </a:spcBef>
-            </a:pPr>
-            <a:r>
-              <a:rPr lang="en-US" dirty="0"/>
-              <a:t>Capture the exact version of the code used for each experiment</a:t>
-            </a:r>
-          </a:p>
-          <a:p>
-            <a:r>
-              <a:rPr lang="en-US" dirty="0"/>
-              <a:t>Use only versions of code that have been thoroughly verified</a:t>
-            </a:r>
-          </a:p>
-          <a:p>
-            <a:r>
-              <a:rPr lang="en-US" dirty="0"/>
-              <a:t>Continue to use regular testing to identify changes due to the underlying platform</a:t>
-            </a:r>
-          </a:p>
-          <a:p>
-            <a:pPr lvl="1">
-              <a:spcBef>
-                <a:spcPts val="200"/>
-              </a:spcBef>
-            </a:pPr>
-            <a:r>
-              <a:rPr lang="en-US" dirty="0"/>
-              <a:t>E.g., compiler release introduces a new optimization that changes numerical results</a:t>
-            </a:r>
-          </a:p>
-          <a:p>
-            <a:r>
-              <a:rPr lang="en-US" dirty="0"/>
-              <a:t>Consider capturing version information of key libraries, compilers, and other dependencies used to build code</a:t>
-            </a:r>
-          </a:p>
-          <a:p>
-            <a:pPr lvl="1">
-              <a:spcBef>
-                <a:spcPts val="200"/>
-              </a:spcBef>
-            </a:pPr>
+              <a:t>What are you going to do, why, and how?</a:t>
+            </a:r>
+          </a:p>
+          <a:p>
+            <a:r>
+              <a:rPr lang="en-US" dirty="0"/>
+              <a:t>Plan your experiments thoroughly</a:t>
+            </a:r>
+          </a:p>
+          <a:p>
+            <a:pPr lvl="1"/>
+            <a:r>
+              <a:rPr lang="en-US" dirty="0"/>
+              <a:t>If you’re in a team, designate </a:t>
+            </a:r>
             <a:r>
               <a:rPr lang="en-US" i="1" dirty="0"/>
-              <a:t>Not often done, in practice</a:t>
+              <a:t>one</a:t>
+            </a:r>
+            <a:r>
+              <a:rPr lang="en-US" dirty="0"/>
+              <a:t> person to coordinate the experimental campaign</a:t>
+            </a:r>
+          </a:p>
+          <a:p>
+            <a:pPr lvl="1"/>
+            <a:r>
+              <a:rPr lang="en-US" dirty="0"/>
+              <a:t>Know what you need (in the code, as inputs, as outputs to capture/analyze, etc.)</a:t>
+            </a:r>
+          </a:p>
+          <a:p>
+            <a:pPr lvl="1"/>
+            <a:r>
+              <a:rPr lang="en-US" dirty="0"/>
+              <a:t>Know how you’re going to process or analyze the results</a:t>
+            </a:r>
+          </a:p>
+          <a:p>
+            <a:pPr lvl="1"/>
+            <a:r>
+              <a:rPr lang="en-US" dirty="0"/>
+              <a:t>Know what to expect (in results, performance/cost, etc.)</a:t>
+            </a:r>
+          </a:p>
+          <a:p>
+            <a:pPr lvl="1"/>
+            <a:r>
+              <a:rPr lang="en-US" dirty="0"/>
+              <a:t>How will you convince yourself that your results are trustworthy?</a:t>
+            </a:r>
+          </a:p>
+          <a:p>
+            <a:r>
+              <a:rPr lang="en-US" dirty="0"/>
+              <a:t>Perform pilot/test runs to build confidence in correctness, performance, scaling</a:t>
+            </a:r>
+          </a:p>
+          <a:p>
+            <a:pPr lvl="1"/>
+            <a:r>
+              <a:rPr lang="en-US" dirty="0"/>
+              <a:t>Often useful to pursue an incremental/layered strategy</a:t>
+            </a:r>
+          </a:p>
+          <a:p>
+            <a:r>
+              <a:rPr lang="en-US" dirty="0"/>
+              <a:t>Ensure that you have the resources to store and/or analyze the outputs</a:t>
+            </a:r>
+          </a:p>
+          <a:p>
+            <a:pPr lvl="1"/>
+            <a:r>
+              <a:rPr lang="en-US" dirty="0"/>
+              <a:t>What can you afford to archive?</a:t>
+            </a:r>
+          </a:p>
+          <a:p>
+            <a:pPr lvl="1"/>
+            <a:r>
+              <a:rPr lang="en-US" dirty="0"/>
+              <a:t>What will you need to process and delete?</a:t>
+            </a:r>
+          </a:p>
+          <a:p>
+            <a:pPr lvl="1"/>
+            <a:r>
+              <a:rPr lang="en-US" dirty="0"/>
+              <a:t>What will you need to process during execution or stream?</a:t>
             </a:r>
           </a:p>
         </p:txBody>
@@ -9509,7 +9616,7 @@
     </p:spTree>
     <p:extLst>
       <p:ext uri="{BB962C8B-B14F-4D97-AF65-F5344CB8AC3E}">
-        <p14:creationId xmlns:p14="http://schemas.microsoft.com/office/powerpoint/2010/main" val="847899985"/>
+        <p14:creationId xmlns:p14="http://schemas.microsoft.com/office/powerpoint/2010/main" val="3488834746"/>
       </p:ext>
     </p:extLst>
   </p:cSld>
@@ -9571,7 +9678,7 @@
             </a:r>
             <a:r>
               <a:rPr lang="en-US" dirty="0"/>
-              <a:t> (3/3)</a:t>
+              <a:t> (2/3)</a:t>
             </a:r>
             <a:endParaRPr lang="en-US" u="sng" dirty="0"/>
           </a:p>
@@ -9595,8 +9702,8 @@
         </p:nvSpPr>
         <p:spPr>
           <a:xfrm>
-            <a:off x="365760" y="1310145"/>
-            <a:ext cx="11369809" cy="4047778"/>
+            <a:off x="365760" y="1280165"/>
+            <a:ext cx="11534052" cy="4047778"/>
           </a:xfrm>
         </p:spPr>
         <p:txBody>
@@ -9609,77 +9716,134 @@
                   <a:schemeClr val="tx2"/>
                 </a:solidFill>
               </a:rPr>
-              <a:t>Be thorough in capturing provenance</a:t>
-            </a:r>
-          </a:p>
-          <a:p>
-            <a:pPr lvl="1"/>
+              <a:t>Can you reproduce the code used for each and every experiment?</a:t>
+            </a:r>
+          </a:p>
+          <a:p>
+            <a:pPr lvl="1">
+              <a:spcBef>
+                <a:spcPts val="200"/>
+              </a:spcBef>
+            </a:pPr>
             <a:r>
               <a:rPr lang="en-US" b="1" dirty="0">
                 <a:solidFill>
                   <a:schemeClr val="tx2"/>
                 </a:solidFill>
               </a:rPr>
-              <a:t> Agents (codes), entities (inputs, outputs, etc.), activities (the transformation)</a:t>
-            </a:r>
-          </a:p>
-          <a:p>
-            <a:r>
-              <a:rPr lang="en-US" dirty="0"/>
-              <a:t>Capture code version</a:t>
-            </a:r>
-          </a:p>
-          <a:p>
-            <a:r>
-              <a:rPr lang="en-US" dirty="0"/>
-              <a:t>Capture all inputs/configuration information for each experiment</a:t>
-            </a:r>
-          </a:p>
-          <a:p>
-            <a:r>
-              <a:rPr lang="en-US" dirty="0"/>
-              <a:t>Use multiple systems to ensure that you can correctly associate inputs, outputs, and code versions</a:t>
-            </a:r>
-          </a:p>
-          <a:p>
-            <a:pPr lvl="1"/>
-            <a:r>
-              <a:rPr lang="en-US" dirty="0"/>
-              <a:t>Systematic directory and file naming conventions</a:t>
-            </a:r>
-          </a:p>
-          <a:p>
-            <a:pPr lvl="1"/>
-            <a:r>
-              <a:rPr lang="en-US" dirty="0"/>
-              <a:t>Separate written notes (paper notebook, electronic notebook)</a:t>
-            </a:r>
-          </a:p>
-          <a:p>
-            <a:pPr lvl="2"/>
-            <a:r>
-              <a:rPr lang="en-US" dirty="0"/>
-              <a:t>Lab notebooks aren’t just for people who literally work in a laboratory!</a:t>
-            </a:r>
-          </a:p>
-          <a:p>
-            <a:pPr lvl="1"/>
-            <a:r>
-              <a:rPr lang="en-US" dirty="0"/>
-              <a:t>Scripts to orchestrate experiments (versioned and captured)</a:t>
-            </a:r>
-          </a:p>
-          <a:p>
-            <a:pPr lvl="1"/>
-            <a:r>
-              <a:rPr lang="en-US" dirty="0"/>
-              <a:t>Version control (if data is not too large)</a:t>
-            </a:r>
-          </a:p>
-          <a:p>
-            <a:r>
-              <a:rPr lang="en-US" dirty="0"/>
-              <a:t>Capture important outputs (as feasible)</a:t>
+              <a:t>Three years later?</a:t>
+            </a:r>
+          </a:p>
+          <a:p>
+            <a:r>
+              <a:rPr lang="en-US" dirty="0"/>
+              <a:t>Use only well-defined versions of code (i.e., official “releases”, tags, etc.)</a:t>
+            </a:r>
+          </a:p>
+          <a:p>
+            <a:pPr lvl="1">
+              <a:spcBef>
+                <a:spcPts val="200"/>
+              </a:spcBef>
+            </a:pPr>
+            <a:r>
+              <a:rPr lang="en-US" dirty="0"/>
+              <a:t>Master or development branches are often moving targets</a:t>
+            </a:r>
+          </a:p>
+          <a:p>
+            <a:pPr lvl="1">
+              <a:spcBef>
+                <a:spcPts val="200"/>
+              </a:spcBef>
+            </a:pPr>
+            <a:r>
+              <a:rPr lang="en-US" dirty="0"/>
+              <a:t>Capture the exact version of the code used for each experiment</a:t>
+            </a:r>
+          </a:p>
+          <a:p>
+            <a:pPr lvl="2">
+              <a:spcBef>
+                <a:spcPts val="200"/>
+              </a:spcBef>
+            </a:pPr>
+            <a:r>
+              <a:rPr lang="en-US" dirty="0"/>
+              <a:t>Is the code you’re building exactly what’s in the version control repo?</a:t>
+            </a:r>
+          </a:p>
+          <a:p>
+            <a:pPr lvl="1">
+              <a:spcBef>
+                <a:spcPts val="200"/>
+              </a:spcBef>
+            </a:pPr>
+            <a:r>
+              <a:rPr lang="en-US" dirty="0"/>
+              <a:t>Don’t change versions during a related series of experiments (unless you have to)</a:t>
+            </a:r>
+          </a:p>
+          <a:p>
+            <a:pPr lvl="1">
+              <a:spcBef>
+                <a:spcPts val="200"/>
+              </a:spcBef>
+            </a:pPr>
+            <a:r>
+              <a:rPr lang="en-US" dirty="0"/>
+              <a:t>If you have to change versions, know exactly what changed</a:t>
+            </a:r>
+          </a:p>
+          <a:p>
+            <a:pPr lvl="2">
+              <a:spcBef>
+                <a:spcPts val="200"/>
+              </a:spcBef>
+            </a:pPr>
+            <a:r>
+              <a:rPr lang="en-US" dirty="0"/>
+              <a:t>Capture the exact version of the code used for each experiment</a:t>
+            </a:r>
+          </a:p>
+          <a:p>
+            <a:r>
+              <a:rPr lang="en-US" dirty="0"/>
+              <a:t>Use only versions of code that have been thoroughly verified</a:t>
+            </a:r>
+          </a:p>
+          <a:p>
+            <a:r>
+              <a:rPr lang="en-US" dirty="0"/>
+              <a:t>Continue to use regular testing to identify changes due to the underlying platform</a:t>
+            </a:r>
+          </a:p>
+          <a:p>
+            <a:pPr lvl="1">
+              <a:spcBef>
+                <a:spcPts val="200"/>
+              </a:spcBef>
+            </a:pPr>
+            <a:r>
+              <a:rPr lang="en-US" dirty="0"/>
+              <a:t>E.g., compiler release introduces a new optimization that changes numerical results</a:t>
+            </a:r>
+          </a:p>
+          <a:p>
+            <a:r>
+              <a:rPr lang="en-US" dirty="0"/>
+              <a:t>Consider capturing version information of key libraries, compilers, and other dependencies used to build code</a:t>
+            </a:r>
+          </a:p>
+          <a:p>
+            <a:pPr lvl="1">
+              <a:spcBef>
+                <a:spcPts val="200"/>
+              </a:spcBef>
+            </a:pPr>
+            <a:r>
+              <a:rPr lang="en-US" i="1" dirty="0"/>
+              <a:t>Not often done, in practice</a:t>
             </a:r>
           </a:p>
         </p:txBody>
@@ -9687,7 +9851,7 @@
     </p:spTree>
     <p:extLst>
       <p:ext uri="{BB962C8B-B14F-4D97-AF65-F5344CB8AC3E}">
-        <p14:creationId xmlns:p14="http://schemas.microsoft.com/office/powerpoint/2010/main" val="1441357727"/>
+        <p14:creationId xmlns:p14="http://schemas.microsoft.com/office/powerpoint/2010/main" val="847899985"/>
       </p:ext>
     </p:extLst>
   </p:cSld>
@@ -9741,12 +9905,17 @@
             </a:r>
             <a:r>
               <a:rPr lang="en-US" i="1" u="sng" dirty="0"/>
-              <a:t>After</a:t>
+              <a:t>During</a:t>
             </a:r>
             <a:r>
               <a:rPr lang="en-US" u="sng" dirty="0"/>
               <a:t> Experiments</a:t>
             </a:r>
+            <a:r>
+              <a:rPr lang="en-US" dirty="0"/>
+              <a:t> (3/3)</a:t>
+            </a:r>
+            <a:endParaRPr lang="en-US" u="sng" dirty="0"/>
           </a:p>
         </p:txBody>
       </p:sp>
@@ -9768,7 +9937,7 @@
         </p:nvSpPr>
         <p:spPr>
           <a:xfrm>
-            <a:off x="365760" y="1115269"/>
+            <a:off x="365760" y="1310145"/>
             <a:ext cx="11369809" cy="4047778"/>
           </a:xfrm>
         </p:spPr>
@@ -9782,134 +9951,77 @@
                   <a:schemeClr val="tx2"/>
                 </a:solidFill>
               </a:rPr>
-              <a:t>Continue provenance capture through data analysis/reduction process</a:t>
-            </a:r>
-          </a:p>
-          <a:p>
-            <a:pPr lvl="1">
-              <a:spcBef>
-                <a:spcPts val="200"/>
-              </a:spcBef>
-            </a:pPr>
+              <a:t>Be thorough in capturing provenance</a:t>
+            </a:r>
+          </a:p>
+          <a:p>
+            <a:pPr lvl="1"/>
             <a:r>
               <a:rPr lang="en-US" b="1" dirty="0">
                 <a:solidFill>
                   <a:schemeClr val="tx2"/>
                 </a:solidFill>
               </a:rPr>
-              <a:t>Agents (codes), entities (inputs, outputs, etc.), activities (the transformation)</a:t>
-            </a:r>
-          </a:p>
-          <a:p>
-            <a:r>
-              <a:rPr lang="en-US" dirty="0"/>
-              <a:t>Script as much of your analysis/reduction as possible</a:t>
-            </a:r>
-          </a:p>
-          <a:p>
-            <a:pPr lvl="1">
-              <a:spcBef>
-                <a:spcPts val="200"/>
-              </a:spcBef>
-            </a:pPr>
-            <a:r>
-              <a:rPr lang="en-US" dirty="0"/>
-              <a:t>Prefer scriptable tools over those requiring human interaction</a:t>
-            </a:r>
-          </a:p>
-          <a:p>
-            <a:pPr lvl="1">
-              <a:spcBef>
-                <a:spcPts val="200"/>
-              </a:spcBef>
-            </a:pPr>
-            <a:r>
-              <a:rPr lang="en-US" dirty="0"/>
-              <a:t>Keep them under version control</a:t>
-            </a:r>
-          </a:p>
-          <a:p>
-            <a:r>
-              <a:rPr lang="en-US" dirty="0"/>
-              <a:t>Document your process thoroughly</a:t>
-            </a:r>
-          </a:p>
-          <a:p>
-            <a:pPr lvl="1">
-              <a:spcBef>
-                <a:spcPts val="200"/>
-              </a:spcBef>
-            </a:pPr>
-            <a:r>
-              <a:rPr lang="en-US" dirty="0"/>
-              <a:t>Separately from scripts, etc.</a:t>
-            </a:r>
-          </a:p>
-          <a:p>
-            <a:pPr lvl="1">
-              <a:spcBef>
-                <a:spcPts val="200"/>
-              </a:spcBef>
-            </a:pPr>
-            <a:r>
-              <a:rPr lang="en-US" dirty="0"/>
-              <a:t>E.g., paper or electronic notebook</a:t>
-            </a:r>
-          </a:p>
-          <a:p>
-            <a:pPr lvl="1">
-              <a:spcBef>
-                <a:spcPts val="200"/>
-              </a:spcBef>
-            </a:pPr>
-            <a:r>
-              <a:rPr lang="en-US" dirty="0"/>
-              <a:t>Especially where human interaction is required</a:t>
-            </a:r>
-          </a:p>
-          <a:p>
-            <a:r>
-              <a:rPr lang="en-US" dirty="0"/>
-              <a:t>Capture key intermediates in the reduction process</a:t>
-            </a:r>
-          </a:p>
-          <a:p>
-            <a:pPr lvl="1">
-              <a:spcBef>
-                <a:spcPts val="200"/>
-              </a:spcBef>
-            </a:pPr>
-            <a:r>
-              <a:rPr lang="en-US" dirty="0"/>
-              <a:t>The more you capture, the more you have to verify (and find problems) later</a:t>
-            </a:r>
-          </a:p>
-          <a:p>
-            <a:r>
-              <a:rPr lang="en-US" dirty="0"/>
-              <a:t>Capture the data (in machine-readable form) used to produce graphs and tables</a:t>
-            </a:r>
-          </a:p>
-          <a:p>
-            <a:pPr lvl="1">
-              <a:spcBef>
-                <a:spcPts val="200"/>
-              </a:spcBef>
-            </a:pPr>
-            <a:r>
-              <a:rPr lang="en-US" dirty="0"/>
-              <a:t>Expected by basic data management plans</a:t>
-            </a:r>
-          </a:p>
-          <a:p>
-            <a:pPr lvl="1">
-              <a:spcBef>
-                <a:spcPts val="200"/>
-              </a:spcBef>
-            </a:pPr>
-            <a:r>
-              <a:rPr lang="en-US" dirty="0"/>
-              <a:t>And an increasing number of publishers</a:t>
+              <a:t> Agents (codes), entities (inputs, outputs, etc.), activities (the transformation)</a:t>
+            </a:r>
+          </a:p>
+          <a:p>
+            <a:r>
+              <a:rPr lang="en-US" dirty="0"/>
+              <a:t>Capture code version</a:t>
+            </a:r>
+          </a:p>
+          <a:p>
+            <a:r>
+              <a:rPr lang="en-US" dirty="0"/>
+              <a:t>Capture all inputs/configuration information for each experiment</a:t>
+            </a:r>
+          </a:p>
+          <a:p>
+            <a:r>
+              <a:rPr lang="en-US" dirty="0"/>
+              <a:t>Use multiple systems to ensure that you can correctly associate inputs, outputs, and code versions</a:t>
+            </a:r>
+          </a:p>
+          <a:p>
+            <a:pPr lvl="1"/>
+            <a:r>
+              <a:rPr lang="en-US" dirty="0"/>
+              <a:t>Systematic directory and file naming conventions</a:t>
+            </a:r>
+          </a:p>
+          <a:p>
+            <a:pPr lvl="1"/>
+            <a:r>
+              <a:rPr lang="en-US" dirty="0"/>
+              <a:t>Separate written notes (paper notebook, electronic notebook)</a:t>
+            </a:r>
+          </a:p>
+          <a:p>
+            <a:pPr lvl="2"/>
+            <a:r>
+              <a:rPr lang="en-US" dirty="0"/>
+              <a:t>Lab notebooks aren’t just for people who literally work in a laboratory!</a:t>
+            </a:r>
+          </a:p>
+          <a:p>
+            <a:pPr lvl="1"/>
+            <a:r>
+              <a:rPr lang="en-US" dirty="0"/>
+              <a:t>Scripts to orchestrate experiments (versioned and captured)</a:t>
+            </a:r>
+          </a:p>
+          <a:p>
+            <a:pPr lvl="1"/>
+            <a:r>
+              <a:rPr lang="en-US" dirty="0"/>
+              <a:t>Version control (if data is not too large)</a:t>
+            </a:r>
+          </a:p>
+          <a:p>
+            <a:r>
+              <a:rPr lang="en-US" dirty="0"/>
+              <a:t>Capture important outputs (as feasible)</a:t>
             </a:r>
           </a:p>
         </p:txBody>
@@ -9917,7 +10029,7 @@
     </p:spTree>
     <p:extLst>
       <p:ext uri="{BB962C8B-B14F-4D97-AF65-F5344CB8AC3E}">
-        <p14:creationId xmlns:p14="http://schemas.microsoft.com/office/powerpoint/2010/main" val="3808973367"/>
+        <p14:creationId xmlns:p14="http://schemas.microsoft.com/office/powerpoint/2010/main" val="1441357727"/>
       </p:ext>
     </p:extLst>
   </p:cSld>
@@ -9949,7 +10061,7 @@
           <p:cNvPr id="2" name="Title 1">
             <a:extLst>
               <a:ext uri="{FF2B5EF4-FFF2-40B4-BE49-F238E27FC236}">
-                <a16:creationId xmlns:a16="http://schemas.microsoft.com/office/drawing/2014/main" id="{E3A332E9-2FA0-40C4-8D47-26B41016D037}"/>
+                <a16:creationId xmlns:a16="http://schemas.microsoft.com/office/drawing/2014/main" id="{AF0E5AE6-BAC5-4D3D-B274-228B336C1693}"/>
               </a:ext>
             </a:extLst>
           </p:cNvPr>
@@ -9967,7 +10079,15 @@
           <a:p>
             <a:r>
               <a:rPr lang="en-US" dirty="0"/>
-              <a:t>Tools May Help with Reproducibility</a:t>
+              <a:t>Strategies for Improving Reproducibility </a:t>
+            </a:r>
+            <a:r>
+              <a:rPr lang="en-US" i="1" u="sng" dirty="0"/>
+              <a:t>After</a:t>
+            </a:r>
+            <a:r>
+              <a:rPr lang="en-US" u="sng" dirty="0"/>
+              <a:t> Experiments</a:t>
             </a:r>
           </a:p>
         </p:txBody>
@@ -9977,7 +10097,7 @@
           <p:cNvPr id="3" name="Content Placeholder 2">
             <a:extLst>
               <a:ext uri="{FF2B5EF4-FFF2-40B4-BE49-F238E27FC236}">
-                <a16:creationId xmlns:a16="http://schemas.microsoft.com/office/drawing/2014/main" id="{735D30F0-B0A3-467E-9909-18B09F1F526A}"/>
+                <a16:creationId xmlns:a16="http://schemas.microsoft.com/office/drawing/2014/main" id="{7E3F8F1F-5081-4F6E-81DA-DC14088609D1}"/>
               </a:ext>
             </a:extLst>
           </p:cNvPr>
@@ -9990,7 +10110,7 @@
         </p:nvSpPr>
         <p:spPr>
           <a:xfrm>
-            <a:off x="365760" y="1207641"/>
+            <a:off x="365760" y="1115269"/>
             <a:ext cx="11369809" cy="4047778"/>
           </a:xfrm>
         </p:spPr>
@@ -9998,124 +10118,148 @@
           <a:bodyPr/>
           <a:lstStyle/>
           <a:p>
-            <a:pPr marL="0" indent="0">
-              <a:buNone/>
-            </a:pPr>
-            <a:r>
-              <a:rPr lang="en-US" dirty="0"/>
-              <a:t>Just a small sampling…</a:t>
-            </a:r>
-          </a:p>
-          <a:p>
-            <a:r>
-              <a:rPr lang="en-US" dirty="0"/>
-              <a:t>Containers to capture the software</a:t>
-            </a:r>
-          </a:p>
-          <a:p>
-            <a:r>
-              <a:rPr lang="en-US" dirty="0"/>
-              <a:t>Resources for finding, understanding, and debugging floating point math problems: </a:t>
-            </a:r>
-            <a:r>
-              <a:rPr lang="en-US" dirty="0">
-                <a:hlinkClick r:id="rId2"/>
-              </a:rPr>
-              <a:t>http://fpanalysistools.org/</a:t>
-            </a:r>
-            <a:endParaRPr lang="en-US" dirty="0"/>
-          </a:p>
-          <a:p>
-            <a:r>
-              <a:rPr lang="en-US" dirty="0"/>
-              <a:t>Cloud platforms to publish and reproduce research code and data</a:t>
-            </a:r>
-          </a:p>
-          <a:p>
-            <a:pPr lvl="1"/>
-            <a:r>
-              <a:rPr lang="en-US" dirty="0"/>
-              <a:t>E.g., </a:t>
-            </a:r>
-            <a:r>
-              <a:rPr lang="en-US" dirty="0">
-                <a:hlinkClick r:id="rId3"/>
-              </a:rPr>
-              <a:t>https://CodeOcean.com</a:t>
-            </a:r>
-            <a:endParaRPr lang="en-US" dirty="0"/>
-          </a:p>
-          <a:p>
-            <a:r>
-              <a:rPr lang="en-US" dirty="0"/>
-              <a:t>DOIs and hosting of data, code, documents, etc.</a:t>
-            </a:r>
-          </a:p>
-          <a:p>
-            <a:pPr lvl="1"/>
-            <a:r>
-              <a:rPr lang="en-US" dirty="0"/>
-              <a:t>E.g., </a:t>
-            </a:r>
-            <a:r>
-              <a:rPr lang="en-US" dirty="0">
-                <a:hlinkClick r:id="rId4"/>
-              </a:rPr>
-              <a:t>https://zenodo.org/</a:t>
-            </a:r>
-            <a:r>
-              <a:rPr lang="en-US" dirty="0"/>
-              <a:t>, </a:t>
-            </a:r>
-            <a:r>
-              <a:rPr lang="en-US" dirty="0">
-                <a:hlinkClick r:id="rId5"/>
-              </a:rPr>
-              <a:t>https://FigShare.com</a:t>
-            </a:r>
-            <a:endParaRPr lang="en-US" dirty="0"/>
-          </a:p>
-          <a:p>
-            <a:pPr marL="0" indent="0">
-              <a:spcBef>
-                <a:spcPts val="2800"/>
-              </a:spcBef>
-              <a:buNone/>
-            </a:pPr>
             <a:r>
               <a:rPr lang="en-US" b="1" dirty="0">
                 <a:solidFill>
                   <a:schemeClr val="tx2"/>
                 </a:solidFill>
               </a:rPr>
-              <a:t>Make sure to test and understand your tools thoroughly </a:t>
-            </a:r>
-            <a:r>
-              <a:rPr lang="en-US" b="1" i="1" dirty="0">
-                <a:solidFill>
-                  <a:schemeClr val="tx2"/>
-                </a:solidFill>
-              </a:rPr>
-              <a:t>before</a:t>
-            </a:r>
+              <a:t>Continue provenance capture through data analysis/reduction process</a:t>
+            </a:r>
+          </a:p>
+          <a:p>
+            <a:pPr lvl="1">
+              <a:spcBef>
+                <a:spcPts val="200"/>
+              </a:spcBef>
+            </a:pPr>
             <a:r>
               <a:rPr lang="en-US" b="1" dirty="0">
                 <a:solidFill>
                   <a:schemeClr val="tx2"/>
                 </a:solidFill>
               </a:rPr>
-              <a:t> using them for something important!</a:t>
-            </a:r>
-          </a:p>
-          <a:p>
-            <a:endParaRPr lang="en-US" dirty="0"/>
+              <a:t>Agents (codes), entities (inputs, outputs, etc.), activities (the transformation)</a:t>
+            </a:r>
+          </a:p>
+          <a:p>
+            <a:r>
+              <a:rPr lang="en-US" dirty="0"/>
+              <a:t>Script as much of your analysis/reduction as possible</a:t>
+            </a:r>
+          </a:p>
+          <a:p>
+            <a:pPr lvl="1">
+              <a:spcBef>
+                <a:spcPts val="200"/>
+              </a:spcBef>
+            </a:pPr>
+            <a:r>
+              <a:rPr lang="en-US" dirty="0"/>
+              <a:t>Prefer scriptable tools over those requiring human interaction</a:t>
+            </a:r>
+          </a:p>
+          <a:p>
+            <a:pPr lvl="1">
+              <a:spcBef>
+                <a:spcPts val="200"/>
+              </a:spcBef>
+            </a:pPr>
+            <a:r>
+              <a:rPr lang="en-US" dirty="0"/>
+              <a:t>Keep them under version control</a:t>
+            </a:r>
+          </a:p>
+          <a:p>
+            <a:r>
+              <a:rPr lang="en-US" dirty="0"/>
+              <a:t>Document your process thoroughly</a:t>
+            </a:r>
+          </a:p>
+          <a:p>
+            <a:pPr lvl="1">
+              <a:spcBef>
+                <a:spcPts val="200"/>
+              </a:spcBef>
+            </a:pPr>
+            <a:r>
+              <a:rPr lang="en-US" dirty="0"/>
+              <a:t>Separately from scripts, etc.</a:t>
+            </a:r>
+          </a:p>
+          <a:p>
+            <a:pPr lvl="1">
+              <a:spcBef>
+                <a:spcPts val="200"/>
+              </a:spcBef>
+            </a:pPr>
+            <a:r>
+              <a:rPr lang="en-US" dirty="0"/>
+              <a:t>E.g., paper or electronic notebook</a:t>
+            </a:r>
+          </a:p>
+          <a:p>
+            <a:pPr lvl="1">
+              <a:spcBef>
+                <a:spcPts val="200"/>
+              </a:spcBef>
+            </a:pPr>
+            <a:r>
+              <a:rPr lang="en-US" dirty="0"/>
+              <a:t>Especially where human interaction is required</a:t>
+            </a:r>
+          </a:p>
+          <a:p>
+            <a:r>
+              <a:rPr lang="en-US" dirty="0"/>
+              <a:t>Capture key intermediates in the reduction process</a:t>
+            </a:r>
+          </a:p>
+          <a:p>
+            <a:pPr lvl="1">
+              <a:spcBef>
+                <a:spcPts val="200"/>
+              </a:spcBef>
+            </a:pPr>
+            <a:r>
+              <a:rPr lang="en-US" dirty="0"/>
+              <a:t>The more you capture, the more you have to verify (and find problems) later</a:t>
+            </a:r>
+          </a:p>
+          <a:p>
+            <a:r>
+              <a:rPr lang="en-US" dirty="0"/>
+              <a:t>Capture the data (in machine-readable form) used to produce graphs and tables</a:t>
+            </a:r>
+          </a:p>
+          <a:p>
+            <a:pPr lvl="1">
+              <a:spcBef>
+                <a:spcPts val="200"/>
+              </a:spcBef>
+            </a:pPr>
+            <a:r>
+              <a:rPr lang="en-US" dirty="0"/>
+              <a:t>Expected by basic data management plans</a:t>
+            </a:r>
+          </a:p>
+          <a:p>
+            <a:pPr lvl="1">
+              <a:spcBef>
+                <a:spcPts val="200"/>
+              </a:spcBef>
+            </a:pPr>
+            <a:r>
+              <a:rPr lang="en-US" dirty="0"/>
+              <a:t>And an increasing number of publishers</a:t>
+            </a:r>
           </a:p>
         </p:txBody>
       </p:sp>
     </p:spTree>
     <p:extLst>
       <p:ext uri="{BB962C8B-B14F-4D97-AF65-F5344CB8AC3E}">
-        <p14:creationId xmlns:p14="http://schemas.microsoft.com/office/powerpoint/2010/main" val="2976835437"/>
+        <p14:creationId xmlns:p14="http://schemas.microsoft.com/office/powerpoint/2010/main" val="3808973367"/>
       </p:ext>
     </p:extLst>
   </p:cSld>
@@ -10350,6 +10494,204 @@
           <p:cNvPr id="2" name="Title 1">
             <a:extLst>
               <a:ext uri="{FF2B5EF4-FFF2-40B4-BE49-F238E27FC236}">
+                <a16:creationId xmlns:a16="http://schemas.microsoft.com/office/drawing/2014/main" id="{E3A332E9-2FA0-40C4-8D47-26B41016D037}"/>
+              </a:ext>
+            </a:extLst>
+          </p:cNvPr>
+          <p:cNvSpPr>
+            <a:spLocks noGrp="1"/>
+          </p:cNvSpPr>
+          <p:nvPr>
+            <p:ph type="title"/>
+          </p:nvPr>
+        </p:nvSpPr>
+        <p:spPr/>
+        <p:txBody>
+          <a:bodyPr/>
+          <a:lstStyle/>
+          <a:p>
+            <a:r>
+              <a:rPr lang="en-US" dirty="0"/>
+              <a:t>Tools May Help with Reproducibility</a:t>
+            </a:r>
+          </a:p>
+        </p:txBody>
+      </p:sp>
+      <p:sp>
+        <p:nvSpPr>
+          <p:cNvPr id="3" name="Content Placeholder 2">
+            <a:extLst>
+              <a:ext uri="{FF2B5EF4-FFF2-40B4-BE49-F238E27FC236}">
+                <a16:creationId xmlns:a16="http://schemas.microsoft.com/office/drawing/2014/main" id="{735D30F0-B0A3-467E-9909-18B09F1F526A}"/>
+              </a:ext>
+            </a:extLst>
+          </p:cNvPr>
+          <p:cNvSpPr>
+            <a:spLocks noGrp="1"/>
+          </p:cNvSpPr>
+          <p:nvPr>
+            <p:ph idx="1"/>
+          </p:nvPr>
+        </p:nvSpPr>
+        <p:spPr>
+          <a:xfrm>
+            <a:off x="365760" y="1207641"/>
+            <a:ext cx="11369809" cy="4047778"/>
+          </a:xfrm>
+        </p:spPr>
+        <p:txBody>
+          <a:bodyPr/>
+          <a:lstStyle/>
+          <a:p>
+            <a:pPr marL="0" indent="0">
+              <a:buNone/>
+            </a:pPr>
+            <a:r>
+              <a:rPr lang="en-US" dirty="0"/>
+              <a:t>Just a small sampling…</a:t>
+            </a:r>
+          </a:p>
+          <a:p>
+            <a:r>
+              <a:rPr lang="en-US" dirty="0"/>
+              <a:t>Containers to capture the software</a:t>
+            </a:r>
+          </a:p>
+          <a:p>
+            <a:r>
+              <a:rPr lang="en-US" dirty="0"/>
+              <a:t>Resources for finding, understanding, and debugging floating point math problems: </a:t>
+            </a:r>
+            <a:r>
+              <a:rPr lang="en-US" dirty="0">
+                <a:hlinkClick r:id="rId2"/>
+              </a:rPr>
+              <a:t>http://fpanalysistools.org/</a:t>
+            </a:r>
+            <a:endParaRPr lang="en-US" dirty="0"/>
+          </a:p>
+          <a:p>
+            <a:r>
+              <a:rPr lang="en-US" dirty="0"/>
+              <a:t>Cloud platforms to publish and reproduce research code and data</a:t>
+            </a:r>
+          </a:p>
+          <a:p>
+            <a:pPr lvl="1"/>
+            <a:r>
+              <a:rPr lang="en-US" dirty="0"/>
+              <a:t>E.g., </a:t>
+            </a:r>
+            <a:r>
+              <a:rPr lang="en-US" dirty="0">
+                <a:hlinkClick r:id="rId3"/>
+              </a:rPr>
+              <a:t>https://CodeOcean.com</a:t>
+            </a:r>
+            <a:endParaRPr lang="en-US" dirty="0"/>
+          </a:p>
+          <a:p>
+            <a:r>
+              <a:rPr lang="en-US" dirty="0"/>
+              <a:t>DOIs and hosting of data, code, documents, etc.</a:t>
+            </a:r>
+          </a:p>
+          <a:p>
+            <a:pPr lvl="1"/>
+            <a:r>
+              <a:rPr lang="en-US" dirty="0"/>
+              <a:t>E.g., </a:t>
+            </a:r>
+            <a:r>
+              <a:rPr lang="en-US" dirty="0">
+                <a:hlinkClick r:id="rId4"/>
+              </a:rPr>
+              <a:t>https://zenodo.org/</a:t>
+            </a:r>
+            <a:r>
+              <a:rPr lang="en-US" dirty="0"/>
+              <a:t>, </a:t>
+            </a:r>
+            <a:r>
+              <a:rPr lang="en-US" dirty="0">
+                <a:hlinkClick r:id="rId5"/>
+              </a:rPr>
+              <a:t>https://FigShare.com</a:t>
+            </a:r>
+            <a:endParaRPr lang="en-US" dirty="0"/>
+          </a:p>
+          <a:p>
+            <a:pPr marL="0" indent="0">
+              <a:spcBef>
+                <a:spcPts val="2800"/>
+              </a:spcBef>
+              <a:buNone/>
+            </a:pPr>
+            <a:r>
+              <a:rPr lang="en-US" b="1" dirty="0">
+                <a:solidFill>
+                  <a:schemeClr val="tx2"/>
+                </a:solidFill>
+              </a:rPr>
+              <a:t>Make sure to test and understand your tools thoroughly </a:t>
+            </a:r>
+            <a:r>
+              <a:rPr lang="en-US" b="1" i="1" dirty="0">
+                <a:solidFill>
+                  <a:schemeClr val="tx2"/>
+                </a:solidFill>
+              </a:rPr>
+              <a:t>before</a:t>
+            </a:r>
+            <a:r>
+              <a:rPr lang="en-US" b="1" dirty="0">
+                <a:solidFill>
+                  <a:schemeClr val="tx2"/>
+                </a:solidFill>
+              </a:rPr>
+              <a:t> using them for something important!</a:t>
+            </a:r>
+          </a:p>
+          <a:p>
+            <a:endParaRPr lang="en-US" dirty="0"/>
+          </a:p>
+        </p:txBody>
+      </p:sp>
+    </p:spTree>
+    <p:extLst>
+      <p:ext uri="{BB962C8B-B14F-4D97-AF65-F5344CB8AC3E}">
+        <p14:creationId xmlns:p14="http://schemas.microsoft.com/office/powerpoint/2010/main" val="2976835437"/>
+      </p:ext>
+    </p:extLst>
+  </p:cSld>
+  <p:clrMapOvr>
+    <a:masterClrMapping/>
+  </p:clrMapOvr>
+</p:sld>
+</file>
+
+<file path=ppt/slides/slide31.xml><?xml version="1.0" encoding="utf-8"?>
+<p:sld xmlns:a="http://schemas.openxmlformats.org/drawingml/2006/main" xmlns:r="http://schemas.openxmlformats.org/officeDocument/2006/relationships" xmlns:p="http://schemas.openxmlformats.org/presentationml/2006/main">
+  <p:cSld>
+    <p:spTree>
+      <p:nvGrpSpPr>
+        <p:cNvPr id="1" name=""/>
+        <p:cNvGrpSpPr/>
+        <p:nvPr/>
+      </p:nvGrpSpPr>
+      <p:grpSpPr>
+        <a:xfrm>
+          <a:off x="0" y="0"/>
+          <a:ext cx="0" cy="0"/>
+          <a:chOff x="0" y="0"/>
+          <a:chExt cx="0" cy="0"/>
+        </a:xfrm>
+      </p:grpSpPr>
+      <p:sp>
+        <p:nvSpPr>
+          <p:cNvPr id="2" name="Title 1">
+            <a:extLst>
+              <a:ext uri="{FF2B5EF4-FFF2-40B4-BE49-F238E27FC236}">
                 <a16:creationId xmlns:a16="http://schemas.microsoft.com/office/drawing/2014/main" id="{4716E6A3-96EC-4523-A436-014C2E270151}"/>
               </a:ext>
             </a:extLst>
@@ -10492,7 +10834,7 @@
 </p:sld>
 </file>
 
-<file path=ppt/slides/slide31.xml><?xml version="1.0" encoding="utf-8"?>
+<file path=ppt/slides/slide32.xml><?xml version="1.0" encoding="utf-8"?>
 <p:sld xmlns:a="http://schemas.openxmlformats.org/drawingml/2006/main" xmlns:r="http://schemas.openxmlformats.org/officeDocument/2006/relationships" xmlns:p="http://schemas.openxmlformats.org/presentationml/2006/main">
   <p:cSld>
     <p:spTree>
@@ -10544,15 +10886,10 @@
         <p:spPr/>
         <p:txBody>
           <a:bodyPr>
-            <a:normAutofit fontScale="92500" lnSpcReduction="10000"/>
+            <a:normAutofit fontScale="85000" lnSpcReduction="20000"/>
           </a:bodyPr>
           <a:lstStyle/>
           <a:p>
-            <a:pPr>
-              <a:spcBef>
-                <a:spcPts val="800"/>
-              </a:spcBef>
-            </a:pPr>
             <a:r>
               <a:rPr lang="en-US" dirty="0"/>
               <a:t>The FAIR Guiding Principles for Scientific Data Management and Stewardship. Mark D. Wilkinson, et al. </a:t>
@@ -10566,11 +10903,6 @@
             <a:endParaRPr lang="en-US" dirty="0"/>
           </a:p>
           <a:p>
-            <a:pPr>
-              <a:spcBef>
-                <a:spcPts val="800"/>
-              </a:spcBef>
-            </a:pPr>
             <a:r>
               <a:rPr lang="en-US" dirty="0"/>
               <a:t>FAIR for Research Software (FAIR4RS) Working Group: </a:t>
@@ -10584,11 +10916,6 @@
             <a:endParaRPr lang="en-US" dirty="0"/>
           </a:p>
           <a:p>
-            <a:pPr>
-              <a:spcBef>
-                <a:spcPts val="800"/>
-              </a:spcBef>
-            </a:pPr>
             <a:r>
               <a:rPr lang="en-US" dirty="0"/>
               <a:t>Editorial: ACM TOMS Replicated Computational Results Initiative. Michael A. Heroux. 2015.  </a:t>
@@ -10618,11 +10945,6 @@
             <a:endParaRPr lang="en-US" dirty="0"/>
           </a:p>
           <a:p>
-            <a:pPr>
-              <a:spcBef>
-                <a:spcPts val="800"/>
-              </a:spcBef>
-            </a:pPr>
             <a:r>
               <a:rPr lang="en-US" dirty="0"/>
               <a:t>Enhancing Reproducibility for Computational Methods. Victoria </a:t>
@@ -10661,11 +10983,6 @@
             </a:r>
           </a:p>
           <a:p>
-            <a:pPr>
-              <a:spcBef>
-                <a:spcPts val="800"/>
-              </a:spcBef>
-            </a:pPr>
             <a:r>
               <a:rPr lang="en-US" dirty="0"/>
               <a:t>Simple experiments in reproducibility and technical trust by Mike Heroux and students (work in progress),</a:t>
@@ -10685,11 +11002,19 @@
             <a:endParaRPr lang="en-US" u="sng" dirty="0"/>
           </a:p>
           <a:p>
-            <a:pPr>
-              <a:spcBef>
-                <a:spcPts val="800"/>
-              </a:spcBef>
-            </a:pPr>
+            <a:r>
+              <a:rPr lang="en-US" dirty="0"/>
+              <a:t>What every scientist should know about floating-point arithmetic. David Goldberg. </a:t>
+            </a:r>
+            <a:r>
+              <a:rPr lang="en-US" dirty="0">
+                <a:hlinkClick r:id="rId6"/>
+              </a:rPr>
+              <a:t>https://doi.org/10.1145/103162.103163</a:t>
+            </a:r>
+            <a:endParaRPr lang="en-US" dirty="0"/>
+          </a:p>
+          <a:p>
             <a:endParaRPr lang="en-US" sz="1600" dirty="0"/>
           </a:p>
         </p:txBody>

</xml_diff>

<commit_message>
Remove a couple of lines that referred to a different structure of the talk
</commit_message>
<xml_diff>
--- a/reproducibility.pptx
+++ b/reproducibility.pptx
@@ -286,7 +286,7 @@
           <a:p>
             <a:fld id="{0B842F42-2CE9-4E35-95C1-410DC08A50B1}" type="datetimeFigureOut">
               <a:rPr lang="en-US" smtClean="0"/>
-              <a:t>9/1/2021</a:t>
+              <a:t>9/14/2021</a:t>
             </a:fld>
             <a:endParaRPr lang="en-US"/>
           </a:p>
@@ -451,7 +451,7 @@
           <a:p>
             <a:fld id="{6F282904-F315-4730-8D91-37D99E141A6F}" type="datetimeFigureOut">
               <a:rPr lang="en-US" smtClean="0"/>
-              <a:t>9/1/2021</a:t>
+              <a:t>9/14/2021</a:t>
             </a:fld>
             <a:endParaRPr lang="en-US"/>
           </a:p>
@@ -5986,34 +5986,6 @@
             <a:r>
               <a:rPr lang="en-US" dirty="0"/>
               <a:t>Increasing requirements for publications (SC, ACM and more)</a:t>
-            </a:r>
-          </a:p>
-          <a:p>
-            <a:pPr marL="346075" lvl="1" indent="0">
-              <a:buNone/>
-            </a:pPr>
-            <a:endParaRPr lang="en-US" dirty="0"/>
-          </a:p>
-          <a:p>
-            <a:pPr marL="346075" lvl="1" indent="0">
-              <a:buNone/>
-            </a:pPr>
-            <a:r>
-              <a:rPr lang="en-US" sz="2400" b="1" dirty="0"/>
-              <a:t>See Appendix</a:t>
-            </a:r>
-            <a:r>
-              <a:rPr lang="en-US" sz="2400" dirty="0"/>
-              <a:t>:</a:t>
-            </a:r>
-          </a:p>
-          <a:p>
-            <a:pPr marL="346075" lvl="1" indent="0">
-              <a:buNone/>
-            </a:pPr>
-            <a:r>
-              <a:rPr lang="en-US" sz="2400" dirty="0"/>
-              <a:t>Requirement Initiatives for Data Management and Publication</a:t>
             </a:r>
           </a:p>
         </p:txBody>
@@ -13483,6 +13455,12 @@
 </file>
 
 <file path=customXml/item1.xml><?xml version="1.0" encoding="utf-8"?>
+<p:properties xmlns:p="http://schemas.microsoft.com/office/2006/metadata/properties" xmlns:xsi="http://www.w3.org/2001/XMLSchema-instance" xmlns:pc="http://schemas.microsoft.com/office/infopath/2007/PartnerControls">
+  <documentManagement/>
+</p:properties>
+</file>
+
+<file path=customXml/item2.xml><?xml version="1.0" encoding="utf-8"?>
 <ct:contentTypeSchema xmlns:ct="http://schemas.microsoft.com/office/2006/metadata/contentType" xmlns:ma="http://schemas.microsoft.com/office/2006/metadata/properties/metaAttributes" ct:_="" ma:_="" ma:contentTypeName="Document" ma:contentTypeID="0x010100565464437F680748A68B85EB6594EA7D" ma:contentTypeVersion="0" ma:contentTypeDescription="Create a new document." ma:contentTypeScope="" ma:versionID="fe3f4dd58d5914c51cfc6deaa8ad845c">
   <xsd:schema xmlns:xsd="http://www.w3.org/2001/XMLSchema" xmlns:p="http://schemas.microsoft.com/office/2006/metadata/properties" targetNamespace="http://schemas.microsoft.com/office/2006/metadata/properties" ma:root="true" ma:fieldsID="4aeb20c0e3442673af7ee10786458764">
     <xsd:element name="properties">
@@ -13531,12 +13509,6 @@
 </ct:contentTypeSchema>
 </file>
 
-<file path=customXml/item2.xml><?xml version="1.0" encoding="utf-8"?>
-<p:properties xmlns:p="http://schemas.microsoft.com/office/2006/metadata/properties" xmlns:xsi="http://www.w3.org/2001/XMLSchema-instance" xmlns:pc="http://schemas.microsoft.com/office/infopath/2007/PartnerControls">
-  <documentManagement/>
-</p:properties>
-</file>
-
 <file path=customXml/item3.xml><?xml version="1.0" encoding="utf-8"?>
 <?mso-contentType ?>
 <FormTemplates xmlns="http://schemas.microsoft.com/sharepoint/v3/contenttype/forms">
@@ -13547,6 +13519,21 @@
 </file>
 
 <file path=customXml/itemProps1.xml><?xml version="1.0" encoding="utf-8"?>
+<ds:datastoreItem xmlns:ds="http://schemas.openxmlformats.org/officeDocument/2006/customXml" ds:itemID="{A50EC660-24D0-43A0-AE5E-E274115E726B}">
+  <ds:schemaRefs>
+    <ds:schemaRef ds:uri="http://purl.org/dc/elements/1.1/"/>
+    <ds:schemaRef ds:uri="http://schemas.microsoft.com/office/2006/metadata/properties"/>
+    <ds:schemaRef ds:uri="http://purl.org/dc/terms/"/>
+    <ds:schemaRef ds:uri="http://schemas.openxmlformats.org/package/2006/metadata/core-properties"/>
+    <ds:schemaRef ds:uri="http://schemas.microsoft.com/office/2006/documentManagement/types"/>
+    <ds:schemaRef ds:uri="http://www.w3.org/XML/1998/namespace"/>
+    <ds:schemaRef ds:uri="http://purl.org/dc/dcmitype/"/>
+    <ds:schemaRef ds:uri="http://schemas.microsoft.com/office/infopath/2007/PartnerControls"/>
+  </ds:schemaRefs>
+</ds:datastoreItem>
+</file>
+
+<file path=customXml/itemProps2.xml><?xml version="1.0" encoding="utf-8"?>
 <ds:datastoreItem xmlns:ds="http://schemas.openxmlformats.org/officeDocument/2006/customXml" ds:itemID="{E8DB7DEB-074E-4EE8-9B6E-FD277323109C}">
   <ds:schemaRefs>
     <ds:schemaRef ds:uri="http://schemas.microsoft.com/office/2006/metadata/contentType"/>
@@ -13561,21 +13548,6 @@
 </ds:datastoreItem>
 </file>
 
-<file path=customXml/itemProps2.xml><?xml version="1.0" encoding="utf-8"?>
-<ds:datastoreItem xmlns:ds="http://schemas.openxmlformats.org/officeDocument/2006/customXml" ds:itemID="{A50EC660-24D0-43A0-AE5E-E274115E726B}">
-  <ds:schemaRefs>
-    <ds:schemaRef ds:uri="http://purl.org/dc/elements/1.1/"/>
-    <ds:schemaRef ds:uri="http://schemas.microsoft.com/office/2006/metadata/properties"/>
-    <ds:schemaRef ds:uri="http://purl.org/dc/terms/"/>
-    <ds:schemaRef ds:uri="http://schemas.openxmlformats.org/package/2006/metadata/core-properties"/>
-    <ds:schemaRef ds:uri="http://schemas.microsoft.com/office/2006/documentManagement/types"/>
-    <ds:schemaRef ds:uri="http://www.w3.org/XML/1998/namespace"/>
-    <ds:schemaRef ds:uri="http://purl.org/dc/dcmitype/"/>
-    <ds:schemaRef ds:uri="http://schemas.microsoft.com/office/infopath/2007/PartnerControls"/>
-  </ds:schemaRefs>
-</ds:datastoreItem>
-</file>
-
 <file path=customXml/itemProps3.xml><?xml version="1.0" encoding="utf-8"?>
 <ds:datastoreItem xmlns:ds="http://schemas.openxmlformats.org/officeDocument/2006/customXml" ds:itemID="{19E20559-B232-4371-8690-E3D8007EDB82}">
   <ds:schemaRefs>

</xml_diff>